<commit_message>
Updating Lesson 15 slides.
</commit_message>
<xml_diff>
--- a/notes/L15/Lsn15.pptx
+++ b/notes/L15/Lsn15.pptx
@@ -5,10 +5,10 @@
     <p:sldMasterId id="2147483648" r:id="rId1"/>
   </p:sldMasterIdLst>
   <p:notesMasterIdLst>
-    <p:notesMasterId r:id="rId18"/>
+    <p:notesMasterId r:id="rId19"/>
   </p:notesMasterIdLst>
   <p:handoutMasterIdLst>
-    <p:handoutMasterId r:id="rId19"/>
+    <p:handoutMasterId r:id="rId20"/>
   </p:handoutMasterIdLst>
   <p:sldIdLst>
     <p:sldId id="282" r:id="rId2"/>
@@ -21,12 +21,13 @@
     <p:sldId id="384" r:id="rId9"/>
     <p:sldId id="385" r:id="rId10"/>
     <p:sldId id="386" r:id="rId11"/>
-    <p:sldId id="387" r:id="rId12"/>
-    <p:sldId id="388" r:id="rId13"/>
-    <p:sldId id="389" r:id="rId14"/>
-    <p:sldId id="372" r:id="rId15"/>
-    <p:sldId id="374" r:id="rId16"/>
-    <p:sldId id="382" r:id="rId17"/>
+    <p:sldId id="390" r:id="rId12"/>
+    <p:sldId id="387" r:id="rId13"/>
+    <p:sldId id="388" r:id="rId14"/>
+    <p:sldId id="389" r:id="rId15"/>
+    <p:sldId id="372" r:id="rId16"/>
+    <p:sldId id="374" r:id="rId17"/>
+    <p:sldId id="382" r:id="rId18"/>
   </p:sldIdLst>
   <p:sldSz cx="9144000" cy="6858000" type="screen4x3"/>
   <p:notesSz cx="6985000" cy="9283700"/>
@@ -3793,11 +3794,7 @@
           <a:p>
             <a:r>
               <a:rPr lang="en-US" dirty="0" smtClean="0"/>
-              <a:t>ECE 382  Lesson </a:t>
-            </a:r>
-            <a:r>
-              <a:rPr lang="en-US" dirty="0" smtClean="0"/>
-              <a:t>15</a:t>
+              <a:t>ECE 382  Lesson 15</a:t>
             </a:r>
             <a:endParaRPr lang="en-US" dirty="0"/>
           </a:p>
@@ -3844,6 +3841,155 @@
               </a:rPr>
               <a:t>Lab#2 Feedback</a:t>
             </a:r>
+          </a:p>
+          <a:p>
+            <a:pPr lvl="1" algn="l"/>
+            <a:r>
+              <a:rPr lang="en-US" sz="2000" dirty="0" smtClean="0">
+                <a:solidFill>
+                  <a:srgbClr val="0070C0"/>
+                </a:solidFill>
+              </a:rPr>
+              <a:t>Serial </a:t>
+            </a:r>
+            <a:r>
+              <a:rPr lang="en-US" sz="2000" dirty="0" err="1">
+                <a:solidFill>
+                  <a:srgbClr val="0070C0"/>
+                </a:solidFill>
+              </a:rPr>
+              <a:t>Comm</a:t>
+            </a:r>
+            <a:r>
+              <a:rPr lang="en-US" sz="2000" dirty="0">
+                <a:solidFill>
+                  <a:srgbClr val="0070C0"/>
+                </a:solidFill>
+              </a:rPr>
+              <a:t> Fundamentals</a:t>
+            </a:r>
+          </a:p>
+          <a:p>
+            <a:pPr lvl="1" algn="l"/>
+            <a:r>
+              <a:rPr lang="en-US" sz="2000" dirty="0" smtClean="0">
+                <a:solidFill>
+                  <a:srgbClr val="0070C0"/>
+                </a:solidFill>
+              </a:rPr>
+              <a:t>Serial </a:t>
+            </a:r>
+            <a:r>
+              <a:rPr lang="en-US" sz="2000" dirty="0">
+                <a:solidFill>
+                  <a:srgbClr val="0070C0"/>
+                </a:solidFill>
+              </a:rPr>
+              <a:t>Peripheral Interface (SPI)</a:t>
+            </a:r>
+          </a:p>
+          <a:p>
+            <a:pPr lvl="1" algn="l"/>
+            <a:r>
+              <a:rPr lang="en-US" sz="2000" dirty="0" smtClean="0">
+                <a:solidFill>
+                  <a:srgbClr val="0070C0"/>
+                </a:solidFill>
+              </a:rPr>
+              <a:t>SPI </a:t>
+            </a:r>
+            <a:r>
+              <a:rPr lang="en-US" sz="2000" dirty="0">
+                <a:solidFill>
+                  <a:srgbClr val="0070C0"/>
+                </a:solidFill>
+              </a:rPr>
+              <a:t>on the </a:t>
+            </a:r>
+            <a:r>
+              <a:rPr lang="en-US" sz="2000" dirty="0" smtClean="0">
+                <a:solidFill>
+                  <a:srgbClr val="0070C0"/>
+                </a:solidFill>
+              </a:rPr>
+              <a:t>MSP430</a:t>
+            </a:r>
+          </a:p>
+          <a:p>
+            <a:pPr lvl="1" algn="l"/>
+            <a:r>
+              <a:rPr lang="en-US" sz="2000" dirty="0">
+                <a:solidFill>
+                  <a:srgbClr val="0070C0"/>
+                </a:solidFill>
+              </a:rPr>
+              <a:t>Logic Analyzer Demo</a:t>
+            </a:r>
+          </a:p>
+          <a:p>
+            <a:pPr lvl="1" algn="l"/>
+            <a:r>
+              <a:rPr lang="en-US" sz="2000" dirty="0" smtClean="0">
+                <a:solidFill>
+                  <a:srgbClr val="0070C0"/>
+                </a:solidFill>
+              </a:rPr>
+              <a:t>Lab </a:t>
+            </a:r>
+            <a:r>
+              <a:rPr lang="en-US" sz="2000" dirty="0">
+                <a:solidFill>
+                  <a:srgbClr val="0070C0"/>
+                </a:solidFill>
+              </a:rPr>
+              <a:t>3 </a:t>
+            </a:r>
+            <a:r>
+              <a:rPr lang="en-US" sz="2000" dirty="0" smtClean="0">
+                <a:solidFill>
+                  <a:srgbClr val="0070C0"/>
+                </a:solidFill>
+              </a:rPr>
+              <a:t>Introduction</a:t>
+            </a:r>
+          </a:p>
+          <a:p>
+            <a:pPr lvl="1" algn="l"/>
+            <a:r>
+              <a:rPr lang="en-US" sz="2000" dirty="0">
+                <a:solidFill>
+                  <a:srgbClr val="0070C0"/>
+                </a:solidFill>
+                <a:hlinkClick r:id="rId2"/>
+              </a:rPr>
+              <a:t>BB-8 in </a:t>
+            </a:r>
+            <a:r>
+              <a:rPr lang="en-US" sz="2000" dirty="0" smtClean="0">
+                <a:solidFill>
+                  <a:srgbClr val="0070C0"/>
+                </a:solidFill>
+                <a:hlinkClick r:id="rId2"/>
+              </a:rPr>
+              <a:t>action</a:t>
+            </a:r>
+            <a:r>
+              <a:rPr lang="en-US" sz="2000" dirty="0" smtClean="0">
+                <a:solidFill>
+                  <a:srgbClr val="0070C0"/>
+                </a:solidFill>
+              </a:rPr>
+              <a:t>, </a:t>
+            </a:r>
+            <a:r>
+              <a:rPr lang="en-US" sz="2000" dirty="0" smtClean="0">
+                <a:solidFill>
+                  <a:srgbClr val="0070C0"/>
+                </a:solidFill>
+                <a:hlinkClick r:id="rId3"/>
+              </a:rPr>
+              <a:t>Cracking open BB-8</a:t>
+            </a:r>
             <a:endParaRPr lang="en-US" sz="2000" dirty="0" smtClean="0">
               <a:solidFill>
                 <a:srgbClr val="0070C0"/>
@@ -3857,113 +4003,11 @@
                 <a:solidFill>
                   <a:srgbClr val="0070C0"/>
                 </a:solidFill>
-              </a:rPr>
-              <a:t>Serial </a:t>
-            </a:r>
-            <a:r>
-              <a:rPr lang="en-US" sz="2000" dirty="0" err="1">
-                <a:solidFill>
-                  <a:srgbClr val="0070C0"/>
-                </a:solidFill>
-              </a:rPr>
-              <a:t>Comm</a:t>
-            </a:r>
-            <a:r>
-              <a:rPr lang="en-US" sz="2000" dirty="0">
-                <a:solidFill>
-                  <a:srgbClr val="0070C0"/>
-                </a:solidFill>
-              </a:rPr>
-              <a:t> Fundamentals</a:t>
-            </a:r>
-          </a:p>
-          <a:p>
-            <a:pPr lvl="1" algn="l"/>
-            <a:r>
-              <a:rPr lang="en-US" sz="2000" dirty="0" smtClean="0">
-                <a:solidFill>
-                  <a:srgbClr val="0070C0"/>
-                </a:solidFill>
-              </a:rPr>
-              <a:t>Serial </a:t>
-            </a:r>
-            <a:r>
-              <a:rPr lang="en-US" sz="2000" dirty="0">
-                <a:solidFill>
-                  <a:srgbClr val="0070C0"/>
-                </a:solidFill>
-              </a:rPr>
-              <a:t>Peripheral Interface (SPI)</a:t>
-            </a:r>
-          </a:p>
-          <a:p>
-            <a:pPr lvl="1" algn="l"/>
-            <a:r>
-              <a:rPr lang="en-US" sz="2000" dirty="0" smtClean="0">
-                <a:solidFill>
-                  <a:srgbClr val="0070C0"/>
-                </a:solidFill>
-              </a:rPr>
-              <a:t>SPI </a:t>
-            </a:r>
-            <a:r>
-              <a:rPr lang="en-US" sz="2000" dirty="0">
-                <a:solidFill>
-                  <a:srgbClr val="0070C0"/>
-                </a:solidFill>
-              </a:rPr>
-              <a:t>on the </a:t>
-            </a:r>
-            <a:r>
-              <a:rPr lang="en-US" sz="2000" dirty="0" smtClean="0">
-                <a:solidFill>
-                  <a:srgbClr val="0070C0"/>
-                </a:solidFill>
-              </a:rPr>
-              <a:t>MSP430</a:t>
-            </a:r>
-          </a:p>
-          <a:p>
-            <a:pPr lvl="1" algn="l"/>
-            <a:r>
-              <a:rPr lang="en-US" sz="2000" dirty="0">
-                <a:solidFill>
-                  <a:srgbClr val="0070C0"/>
-                </a:solidFill>
-              </a:rPr>
-              <a:t>Logic Analyzer Demo</a:t>
-            </a:r>
-          </a:p>
-          <a:p>
-            <a:pPr lvl="1" algn="l"/>
-            <a:r>
-              <a:rPr lang="en-US" sz="2000" dirty="0" smtClean="0">
-                <a:solidFill>
-                  <a:srgbClr val="0070C0"/>
-                </a:solidFill>
-              </a:rPr>
-              <a:t>Lab </a:t>
-            </a:r>
-            <a:r>
-              <a:rPr lang="en-US" sz="2000" dirty="0">
-                <a:solidFill>
-                  <a:srgbClr val="0070C0"/>
-                </a:solidFill>
-              </a:rPr>
-              <a:t>3 Introduction</a:t>
-            </a:r>
-          </a:p>
-          <a:p>
-            <a:pPr lvl="1" algn="l"/>
-            <a:r>
-              <a:rPr lang="en-US" sz="2000" dirty="0">
-                <a:solidFill>
-                  <a:srgbClr val="0070C0"/>
-                </a:solidFill>
-              </a:rPr>
-              <a:t> </a:t>
-            </a:r>
-            <a:endParaRPr lang="en-US" sz="2000" dirty="0">
+                <a:hlinkClick r:id="rId4"/>
+              </a:rPr>
+              <a:t>STM32F3</a:t>
+            </a:r>
+            <a:endParaRPr lang="en-US" sz="2000" dirty="0" smtClean="0">
               <a:solidFill>
                 <a:srgbClr val="0070C0"/>
               </a:solidFill>
@@ -3975,7 +4019,6 @@
               <a:rPr lang="en-US" sz="2000" b="1" dirty="0" smtClean="0"/>
               <a:t>Admin</a:t>
             </a:r>
-            <a:endParaRPr lang="en-US" sz="2000" b="1" dirty="0"/>
           </a:p>
           <a:p>
             <a:pPr lvl="1" algn="l"/>
@@ -3985,15 +4028,26 @@
                   <a:srgbClr val="0070C0"/>
                 </a:solidFill>
               </a:rPr>
-              <a:t>Assignment </a:t>
-            </a:r>
+              <a:t>Assignment 5 due BOC</a:t>
+            </a:r>
+          </a:p>
+          <a:p>
+            <a:pPr lvl="1" algn="l"/>
             <a:r>
               <a:rPr lang="en-US" sz="2000" dirty="0" smtClean="0">
                 <a:solidFill>
                   <a:srgbClr val="0070C0"/>
                 </a:solidFill>
               </a:rPr>
-              <a:t>4 due </a:t>
+              <a:t>Lab 3 </a:t>
+            </a:r>
+            <a:r>
+              <a:rPr lang="en-US" sz="2000" dirty="0" err="1" smtClean="0">
+                <a:solidFill>
+                  <a:srgbClr val="0070C0"/>
+                </a:solidFill>
+              </a:rPr>
+              <a:t>prelab</a:t>
             </a:r>
             <a:r>
               <a:rPr lang="en-US" sz="2000" dirty="0" smtClean="0">
@@ -4001,34 +4055,7 @@
                   <a:srgbClr val="0070C0"/>
                 </a:solidFill>
               </a:rPr>
-              <a:t>BOC</a:t>
-            </a:r>
-          </a:p>
-          <a:p>
-            <a:pPr lvl="1" algn="l"/>
-            <a:r>
-              <a:rPr lang="en-US" sz="2000" dirty="0" smtClean="0">
-                <a:solidFill>
-                  <a:srgbClr val="0070C0"/>
-                </a:solidFill>
-              </a:rPr>
-              <a:t>Lab 3 </a:t>
-            </a:r>
-            <a:r>
-              <a:rPr lang="en-US" sz="2000" dirty="0" err="1" smtClean="0">
-                <a:solidFill>
-                  <a:srgbClr val="0070C0"/>
-                </a:solidFill>
-              </a:rPr>
-              <a:t>prelab</a:t>
-            </a:r>
-            <a:r>
-              <a:rPr lang="en-US" sz="2000" dirty="0" smtClean="0">
-                <a:solidFill>
-                  <a:srgbClr val="0070C0"/>
-                </a:solidFill>
-              </a:rPr>
-              <a:t>? (a bit different this time)</a:t>
+              <a:t>? (a bit different this time…must be typed, pushed, and printed by EOC)</a:t>
             </a:r>
             <a:endParaRPr lang="en-US" sz="2400" dirty="0" smtClean="0"/>
           </a:p>
@@ -4475,6 +4502,70 @@
           </a:extLst>
         </p:spPr>
       </p:pic>
+      <p:sp>
+        <p:nvSpPr>
+          <p:cNvPr id="6" name="TextBox 5"/>
+          <p:cNvSpPr txBox="1"/>
+          <p:nvPr/>
+        </p:nvSpPr>
+        <p:spPr>
+          <a:xfrm>
+            <a:off x="5537915" y="6232337"/>
+            <a:ext cx="3606085" cy="461665"/>
+          </a:xfrm>
+          <a:prstGeom prst="rect">
+            <a:avLst/>
+          </a:prstGeom>
+          <a:noFill/>
+        </p:spPr>
+        <p:txBody>
+          <a:bodyPr wrap="square" rtlCol="0">
+            <a:spAutoFit/>
+          </a:bodyPr>
+          <a:lstStyle/>
+          <a:p>
+            <a:r>
+              <a:rPr lang="en-US" dirty="0" smtClean="0"/>
+              <a:t>pp 437 for Block Diagram</a:t>
+            </a:r>
+            <a:endParaRPr lang="en-US" dirty="0"/>
+          </a:p>
+        </p:txBody>
+      </p:sp>
+      <p:sp>
+        <p:nvSpPr>
+          <p:cNvPr id="7" name="TextBox 6"/>
+          <p:cNvSpPr txBox="1"/>
+          <p:nvPr/>
+        </p:nvSpPr>
+        <p:spPr>
+          <a:xfrm>
+            <a:off x="1569080" y="589244"/>
+            <a:ext cx="3606085" cy="461665"/>
+          </a:xfrm>
+          <a:prstGeom prst="rect">
+            <a:avLst/>
+          </a:prstGeom>
+          <a:noFill/>
+        </p:spPr>
+        <p:txBody>
+          <a:bodyPr wrap="square" rtlCol="0">
+            <a:spAutoFit/>
+          </a:bodyPr>
+          <a:lstStyle/>
+          <a:p>
+            <a:r>
+              <a:rPr lang="en-US" dirty="0" err="1" smtClean="0"/>
+              <a:t>i.e</a:t>
+            </a:r>
+            <a:r>
+              <a:rPr lang="en-US" dirty="0" smtClean="0"/>
+              <a:t> (SW reset)</a:t>
+            </a:r>
+            <a:endParaRPr lang="en-US" dirty="0"/>
+          </a:p>
+        </p:txBody>
+      </p:sp>
     </p:spTree>
     <p:extLst>
       <p:ext uri="{BB962C8B-B14F-4D97-AF65-F5344CB8AC3E}">
@@ -4485,6 +4576,85 @@
   <p:clrMapOvr>
     <a:masterClrMapping/>
   </p:clrMapOvr>
+  <p:timing>
+    <p:tnLst>
+      <p:par>
+        <p:cTn id="1" dur="indefinite" restart="never" nodeType="tmRoot">
+          <p:childTnLst>
+            <p:seq concurrent="1" nextAc="seek">
+              <p:cTn id="2" dur="indefinite" nodeType="mainSeq">
+                <p:childTnLst>
+                  <p:par>
+                    <p:cTn id="3" fill="hold">
+                      <p:stCondLst>
+                        <p:cond delay="indefinite"/>
+                      </p:stCondLst>
+                      <p:childTnLst>
+                        <p:par>
+                          <p:cTn id="4" fill="hold">
+                            <p:stCondLst>
+                              <p:cond delay="0"/>
+                            </p:stCondLst>
+                            <p:childTnLst>
+                              <p:par>
+                                <p:cTn id="5" presetID="1" presetClass="entr" presetSubtype="0" fill="hold" nodeType="clickEffect">
+                                  <p:stCondLst>
+                                    <p:cond delay="0"/>
+                                  </p:stCondLst>
+                                  <p:childTnLst>
+                                    <p:set>
+                                      <p:cBhvr>
+                                        <p:cTn id="6" dur="1" fill="hold">
+                                          <p:stCondLst>
+                                            <p:cond delay="0"/>
+                                          </p:stCondLst>
+                                        </p:cTn>
+                                        <p:tgtEl>
+                                          <p:spTgt spid="7">
+                                            <p:txEl>
+                                              <p:pRg st="0" end="0"/>
+                                            </p:txEl>
+                                          </p:spTgt>
+                                        </p:tgtEl>
+                                        <p:attrNameLst>
+                                          <p:attrName>style.visibility</p:attrName>
+                                        </p:attrNameLst>
+                                      </p:cBhvr>
+                                      <p:to>
+                                        <p:strVal val="visible"/>
+                                      </p:to>
+                                    </p:set>
+                                  </p:childTnLst>
+                                </p:cTn>
+                              </p:par>
+                            </p:childTnLst>
+                          </p:cTn>
+                        </p:par>
+                      </p:childTnLst>
+                    </p:cTn>
+                  </p:par>
+                </p:childTnLst>
+              </p:cTn>
+              <p:prevCondLst>
+                <p:cond evt="onPrev" delay="0">
+                  <p:tgtEl>
+                    <p:sldTgt/>
+                  </p:tgtEl>
+                </p:cond>
+              </p:prevCondLst>
+              <p:nextCondLst>
+                <p:cond evt="onNext" delay="0">
+                  <p:tgtEl>
+                    <p:sldTgt/>
+                  </p:tgtEl>
+                </p:cond>
+              </p:nextCondLst>
+            </p:seq>
+          </p:childTnLst>
+        </p:cTn>
+      </p:par>
+    </p:tnLst>
+  </p:timing>
 </p:sld>
 </file>
 
@@ -4521,10 +4691,10 @@
           <a:lstStyle/>
           <a:p>
             <a:r>
-              <a:rPr lang="en-US" sz="2400" b="1" dirty="0"/>
-              <a:t>Universal Serial Communication Interface (USCI)</a:t>
-            </a:r>
-            <a:endParaRPr lang="en-US" sz="2400" dirty="0"/>
+              <a:rPr lang="en-US" dirty="0" smtClean="0"/>
+              <a:t>Example SPI Setup for Lab 3 </a:t>
+            </a:r>
+            <a:endParaRPr lang="en-US" dirty="0"/>
           </a:p>
         </p:txBody>
       </p:sp>
@@ -4540,310 +4710,255 @@
         </p:nvSpPr>
         <p:spPr>
           <a:xfrm>
-            <a:off x="596787" y="797065"/>
-            <a:ext cx="8215440" cy="4724400"/>
+            <a:off x="685800" y="1371600"/>
+            <a:ext cx="8103358" cy="4724400"/>
           </a:xfrm>
         </p:spPr>
         <p:txBody>
           <a:bodyPr/>
           <a:lstStyle/>
           <a:p>
+            <a:endParaRPr lang="en-US" dirty="0" smtClean="0"/>
+          </a:p>
+          <a:p>
+            <a:pPr marL="0" indent="0">
+              <a:buNone/>
+              <a:tabLst>
+                <a:tab pos="463550" algn="l"/>
+              </a:tabLst>
+            </a:pPr>
             <a:r>
               <a:rPr lang="en-US" sz="2000" dirty="0" smtClean="0"/>
-              <a:t>Step 5</a:t>
+              <a:t>1)</a:t>
+            </a:r>
+            <a:r>
+              <a:rPr lang="en-US" sz="2000" dirty="0"/>
+              <a:t>	</a:t>
+            </a:r>
+            <a:r>
+              <a:rPr lang="en-US" sz="2000" dirty="0" err="1" smtClean="0"/>
+              <a:t>bis.b</a:t>
+            </a:r>
+            <a:r>
+              <a:rPr lang="en-US" sz="2000" dirty="0"/>
+              <a:t>	</a:t>
+            </a:r>
+            <a:r>
+              <a:rPr lang="en-US" sz="2000" dirty="0" smtClean="0"/>
+              <a:t>#UCSWRST</a:t>
+            </a:r>
+            <a:r>
+              <a:rPr lang="en-US" sz="2000" dirty="0"/>
+              <a:t>, &amp;</a:t>
+            </a:r>
+            <a:r>
+              <a:rPr lang="en-US" sz="2000" dirty="0" smtClean="0"/>
+              <a:t>UCB0CTL1</a:t>
             </a:r>
             <a:endParaRPr lang="en-US" sz="2000" dirty="0"/>
           </a:p>
           <a:p>
-            <a:pPr lvl="1"/>
-            <a:r>
-              <a:rPr lang="en-US" sz="1600" dirty="0" smtClean="0">
-                <a:solidFill>
-                  <a:schemeClr val="accent2"/>
-                </a:solidFill>
-              </a:rPr>
-              <a:t>Use </a:t>
-            </a:r>
-            <a:r>
-              <a:rPr lang="en-US" sz="1600" dirty="0">
-                <a:solidFill>
-                  <a:schemeClr val="accent2"/>
-                </a:solidFill>
-              </a:rPr>
-              <a:t>the subsystem</a:t>
-            </a:r>
-            <a:r>
-              <a:rPr lang="en-US" sz="1600" dirty="0" smtClean="0">
-                <a:solidFill>
-                  <a:schemeClr val="accent2"/>
-                </a:solidFill>
-              </a:rPr>
-              <a:t>! </a:t>
-            </a:r>
-          </a:p>
-          <a:p>
-            <a:pPr lvl="2"/>
-            <a:r>
-              <a:rPr lang="en-US" sz="1400" dirty="0"/>
-              <a:t>To send a byte, just write to the </a:t>
-            </a:r>
-            <a:r>
-              <a:rPr lang="en-US" sz="1400" dirty="0">
-                <a:solidFill>
-                  <a:schemeClr val="accent2"/>
-                </a:solidFill>
-              </a:rPr>
-              <a:t>TXBUF</a:t>
-            </a:r>
-            <a:r>
-              <a:rPr lang="en-US" sz="1400" dirty="0"/>
-              <a:t> register. </a:t>
-            </a:r>
-            <a:r>
-              <a:rPr lang="en-US" sz="1400" dirty="0" smtClean="0"/>
-              <a:t> [16.4.6]</a:t>
-            </a:r>
-          </a:p>
-          <a:p>
-            <a:pPr lvl="2"/>
-            <a:r>
-              <a:rPr lang="en-US" sz="1400" dirty="0" smtClean="0"/>
-              <a:t>To </a:t>
-            </a:r>
-            <a:r>
-              <a:rPr lang="en-US" sz="1400" dirty="0"/>
-              <a:t>read a received byte, read from the </a:t>
-            </a:r>
-            <a:r>
-              <a:rPr lang="en-US" sz="1400" dirty="0">
-                <a:solidFill>
-                  <a:schemeClr val="accent2"/>
-                </a:solidFill>
-              </a:rPr>
-              <a:t>RXBUF</a:t>
-            </a:r>
-            <a:r>
-              <a:rPr lang="en-US" sz="1400" dirty="0"/>
-              <a:t> register</a:t>
-            </a:r>
-            <a:r>
-              <a:rPr lang="en-US" sz="1400" dirty="0" smtClean="0"/>
-              <a:t>. </a:t>
-            </a:r>
-            <a:r>
-              <a:rPr lang="en-US" sz="1400" dirty="0"/>
-              <a:t>[</a:t>
-            </a:r>
-            <a:r>
-              <a:rPr lang="en-US" sz="1400" dirty="0" smtClean="0"/>
-              <a:t>16.4.7]</a:t>
-            </a:r>
-            <a:endParaRPr lang="en-US" sz="1400" dirty="0"/>
-          </a:p>
-          <a:p>
-            <a:pPr lvl="1"/>
-            <a:r>
-              <a:rPr lang="en-US" sz="1600" dirty="0" smtClean="0">
-                <a:solidFill>
-                  <a:schemeClr val="accent2"/>
-                </a:solidFill>
-              </a:rPr>
-              <a:t>How do  you know “you’ve got mail” or last transmission is done?</a:t>
-            </a:r>
-          </a:p>
-          <a:p>
-            <a:pPr lvl="2"/>
-            <a:r>
-              <a:rPr lang="en-US" sz="1400" dirty="0" smtClean="0"/>
-              <a:t>You've </a:t>
-            </a:r>
-            <a:r>
-              <a:rPr lang="en-US" sz="1400" dirty="0"/>
-              <a:t>got to monitor the flags in the </a:t>
-            </a:r>
-            <a:r>
-              <a:rPr lang="en-US" sz="1400" dirty="0">
-                <a:solidFill>
-                  <a:schemeClr val="accent2"/>
-                </a:solidFill>
-              </a:rPr>
-              <a:t>IFG2</a:t>
-            </a:r>
-            <a:r>
-              <a:rPr lang="en-US" sz="1400" dirty="0"/>
-              <a:t> register </a:t>
-            </a:r>
-            <a:r>
-              <a:rPr lang="en-US" sz="1400" dirty="0" smtClean="0"/>
-              <a:t>[16.4.9] to </a:t>
-            </a:r>
-            <a:r>
-              <a:rPr lang="en-US" sz="1400" dirty="0"/>
-              <a:t>know when it's safe the </a:t>
-            </a:r>
-            <a:r>
-              <a:rPr lang="en-US" sz="1400" dirty="0" smtClean="0"/>
-              <a:t>send</a:t>
-            </a:r>
-            <a:endParaRPr lang="en-US" sz="1400" dirty="0"/>
-          </a:p>
-          <a:p>
-            <a:pPr lvl="1"/>
-            <a:r>
-              <a:rPr lang="en-US" sz="1800" dirty="0" smtClean="0">
-                <a:solidFill>
-                  <a:schemeClr val="accent2"/>
-                </a:solidFill>
-              </a:rPr>
-              <a:t>TXIFG </a:t>
-            </a:r>
-          </a:p>
-          <a:p>
-            <a:pPr lvl="2"/>
-            <a:r>
-              <a:rPr lang="en-US" sz="1600" dirty="0" smtClean="0"/>
-              <a:t>Set </a:t>
-            </a:r>
-            <a:r>
-              <a:rPr lang="en-US" sz="1600" dirty="0"/>
-              <a:t>when </a:t>
-            </a:r>
-            <a:r>
-              <a:rPr lang="en-US" sz="1600" dirty="0">
-                <a:solidFill>
-                  <a:schemeClr val="accent2"/>
-                </a:solidFill>
-              </a:rPr>
-              <a:t>TXBUF</a:t>
-            </a:r>
-            <a:r>
-              <a:rPr lang="en-US" sz="1600" dirty="0"/>
-              <a:t> is ready for a byte</a:t>
-            </a:r>
-          </a:p>
-          <a:p>
-            <a:pPr lvl="2"/>
-            <a:r>
-              <a:rPr lang="en-US" sz="1600" dirty="0" smtClean="0"/>
-              <a:t>Cleared </a:t>
-            </a:r>
-            <a:r>
-              <a:rPr lang="en-US" sz="1600" dirty="0"/>
-              <a:t>on write</a:t>
-            </a:r>
-          </a:p>
-          <a:p>
-            <a:pPr lvl="2"/>
-            <a:r>
-              <a:rPr lang="en-US" sz="1600" dirty="0" smtClean="0"/>
-              <a:t>Just </a:t>
-            </a:r>
-            <a:r>
-              <a:rPr lang="en-US" sz="1600" dirty="0"/>
-              <a:t>because the TXBUF is ready for another byte doesn't mean that the transmission is complete! It's double-buffered!</a:t>
-            </a:r>
-          </a:p>
-          <a:p>
-            <a:pPr lvl="1"/>
-            <a:r>
-              <a:rPr lang="en-US" sz="1800" dirty="0" smtClean="0">
-                <a:solidFill>
-                  <a:schemeClr val="accent2"/>
-                </a:solidFill>
-              </a:rPr>
-              <a:t>RXIFG</a:t>
-            </a:r>
-          </a:p>
-          <a:p>
-            <a:pPr lvl="2"/>
-            <a:r>
-              <a:rPr lang="en-US" sz="1600" dirty="0" smtClean="0"/>
-              <a:t>Set </a:t>
-            </a:r>
-            <a:r>
-              <a:rPr lang="en-US" sz="1600" dirty="0"/>
-              <a:t>when </a:t>
-            </a:r>
-            <a:r>
-              <a:rPr lang="en-US" sz="1600" dirty="0">
-                <a:solidFill>
-                  <a:schemeClr val="accent2"/>
-                </a:solidFill>
-              </a:rPr>
-              <a:t>RXBUF</a:t>
-            </a:r>
-            <a:r>
-              <a:rPr lang="en-US" sz="1600" dirty="0"/>
-              <a:t> has received a complete character</a:t>
-            </a:r>
-          </a:p>
-          <a:p>
-            <a:pPr lvl="2"/>
-            <a:r>
-              <a:rPr lang="en-US" sz="1600" dirty="0" smtClean="0"/>
-              <a:t>Cleared </a:t>
-            </a:r>
-            <a:r>
-              <a:rPr lang="en-US" sz="1600" dirty="0"/>
-              <a:t>on read</a:t>
-            </a:r>
-          </a:p>
-          <a:p>
-            <a:pPr lvl="2"/>
-            <a:r>
-              <a:rPr lang="en-US" sz="1600" dirty="0" smtClean="0"/>
-              <a:t>This </a:t>
-            </a:r>
-            <a:r>
-              <a:rPr lang="en-US" sz="1600" dirty="0"/>
-              <a:t>is what you should monitor to determine a transmission has completed</a:t>
-            </a:r>
-            <a:r>
-              <a:rPr lang="en-US" sz="1600" dirty="0" smtClean="0"/>
-              <a:t>!</a:t>
-            </a:r>
-            <a:endParaRPr lang="en-US" sz="1600" dirty="0"/>
-          </a:p>
-          <a:p>
-            <a:endParaRPr lang="en-US" sz="2400" dirty="0" smtClean="0"/>
-          </a:p>
-          <a:p>
-            <a:endParaRPr lang="en-US" sz="2400" dirty="0" smtClean="0">
-              <a:solidFill>
-                <a:schemeClr val="accent2"/>
-              </a:solidFill>
-            </a:endParaRPr>
-          </a:p>
-          <a:p>
             <a:pPr marL="0" indent="0">
               <a:buNone/>
+              <a:tabLst>
+                <a:tab pos="463550" algn="l"/>
+              </a:tabLst>
             </a:pPr>
-            <a:endParaRPr lang="en-US" sz="1400" dirty="0">
-              <a:solidFill>
-                <a:schemeClr val="accent2"/>
-              </a:solidFill>
-              <a:latin typeface="Courier New" pitchFamily="49" charset="0"/>
-              <a:cs typeface="Courier New" pitchFamily="49" charset="0"/>
-            </a:endParaRPr>
+            <a:r>
+              <a:rPr lang="en-US" sz="2000" dirty="0" smtClean="0"/>
+              <a:t>2)</a:t>
+            </a:r>
+            <a:r>
+              <a:rPr lang="en-US" sz="2000" dirty="0"/>
+              <a:t>	</a:t>
+            </a:r>
+            <a:r>
+              <a:rPr lang="en-US" sz="2000" dirty="0" err="1" smtClean="0"/>
+              <a:t>mov</a:t>
+            </a:r>
+            <a:r>
+              <a:rPr lang="en-US" sz="2000" dirty="0" smtClean="0"/>
+              <a:t> 	#</a:t>
+            </a:r>
+            <a:r>
+              <a:rPr lang="en-US" sz="2000" dirty="0"/>
+              <a:t>UCCKPH|UCMSB|UCMST|UCSYNC, &amp;UCB0CTL0</a:t>
+            </a:r>
           </a:p>
           <a:p>
             <a:pPr marL="0" indent="0">
               <a:buNone/>
+              <a:tabLst>
+                <a:tab pos="463550" algn="l"/>
+              </a:tabLst>
             </a:pPr>
-            <a:endParaRPr lang="en-US" sz="1400" dirty="0"/>
+            <a:r>
+              <a:rPr lang="en-US" sz="2000" dirty="0"/>
+              <a:t>	</a:t>
+            </a:r>
+            <a:r>
+              <a:rPr lang="en-US" sz="2000" dirty="0" err="1" smtClean="0"/>
+              <a:t>bis</a:t>
+            </a:r>
+            <a:r>
+              <a:rPr lang="en-US" sz="2000" dirty="0" smtClean="0"/>
+              <a:t> 	#</a:t>
+            </a:r>
+            <a:r>
+              <a:rPr lang="en-US" sz="2000" dirty="0"/>
+              <a:t>UCSSEL_2, &amp;UCB0CTL1</a:t>
+            </a:r>
+          </a:p>
+          <a:p>
+            <a:pPr marL="0" indent="0">
+              <a:buNone/>
+              <a:tabLst>
+                <a:tab pos="463550" algn="l"/>
+              </a:tabLst>
+            </a:pPr>
+            <a:r>
+              <a:rPr lang="en-US" sz="2000" dirty="0"/>
+              <a:t>	</a:t>
+            </a:r>
+            <a:r>
+              <a:rPr lang="en-US" sz="2000" dirty="0" err="1" smtClean="0"/>
+              <a:t>bis</a:t>
+            </a:r>
+            <a:r>
+              <a:rPr lang="en-US" sz="2000" dirty="0" smtClean="0"/>
+              <a:t> 	#</a:t>
+            </a:r>
+            <a:r>
+              <a:rPr lang="en-US" sz="2000" dirty="0"/>
+              <a:t>BIT0, &amp;UCB0BR0</a:t>
+            </a:r>
+          </a:p>
+          <a:p>
+            <a:pPr marL="0" indent="0">
+              <a:buNone/>
+              <a:tabLst>
+                <a:tab pos="463550" algn="l"/>
+              </a:tabLst>
+            </a:pPr>
+            <a:r>
+              <a:rPr lang="en-US" sz="2000" dirty="0"/>
+              <a:t>	</a:t>
+            </a:r>
+            <a:r>
+              <a:rPr lang="en-US" sz="2000" dirty="0" err="1" smtClean="0"/>
+              <a:t>clr</a:t>
+            </a:r>
+            <a:r>
+              <a:rPr lang="en-US" sz="2000" dirty="0"/>
+              <a:t>	&amp;UCB0BR1</a:t>
+            </a:r>
+          </a:p>
+          <a:p>
+            <a:pPr marL="0" indent="0">
+              <a:buNone/>
+              <a:tabLst>
+                <a:tab pos="463550" algn="l"/>
+              </a:tabLst>
+            </a:pPr>
+            <a:r>
+              <a:rPr lang="en-US" sz="2000" dirty="0" smtClean="0"/>
+              <a:t>3)</a:t>
+            </a:r>
+            <a:r>
+              <a:rPr lang="en-US" sz="2000" dirty="0"/>
+              <a:t>	</a:t>
+            </a:r>
+            <a:r>
+              <a:rPr lang="en-US" sz="2000" dirty="0" err="1" smtClean="0"/>
+              <a:t>bis</a:t>
+            </a:r>
+            <a:r>
+              <a:rPr lang="en-US" sz="2000" dirty="0"/>
+              <a:t>	#LCD_SCLK_PIN|LCD_MOSI_PIN|LCD_MISO_PIN, &amp;P1SEL</a:t>
+            </a:r>
+          </a:p>
+          <a:p>
+            <a:pPr marL="0" indent="0">
+              <a:buNone/>
+              <a:tabLst>
+                <a:tab pos="463550" algn="l"/>
+              </a:tabLst>
+            </a:pPr>
+            <a:r>
+              <a:rPr lang="en-US" sz="2000" dirty="0"/>
+              <a:t>	</a:t>
+            </a:r>
+            <a:r>
+              <a:rPr lang="en-US" sz="2000" dirty="0" err="1" smtClean="0"/>
+              <a:t>bis</a:t>
+            </a:r>
+            <a:r>
+              <a:rPr lang="en-US" sz="2000" dirty="0"/>
+              <a:t>	#LCD_SCLK_PIN|LCD_MOSI_PIN|LCD_MISO_PIN, &amp;</a:t>
+            </a:r>
+            <a:r>
+              <a:rPr lang="en-US" sz="2000" dirty="0" smtClean="0"/>
+              <a:t>P1SEL2</a:t>
+            </a:r>
+          </a:p>
+          <a:p>
+            <a:pPr marL="0" indent="0">
+              <a:buNone/>
+              <a:tabLst>
+                <a:tab pos="463550" algn="l"/>
+              </a:tabLst>
+            </a:pPr>
+            <a:r>
+              <a:rPr lang="en-US" sz="2000" dirty="0" smtClean="0"/>
+              <a:t>4)</a:t>
+            </a:r>
+            <a:r>
+              <a:rPr lang="en-US" sz="2000" dirty="0"/>
+              <a:t>	</a:t>
+            </a:r>
+            <a:r>
+              <a:rPr lang="en-US" sz="2000" dirty="0" err="1"/>
+              <a:t>bic.b</a:t>
+            </a:r>
+            <a:r>
+              <a:rPr lang="en-US" sz="2000" dirty="0"/>
+              <a:t>	#UCSWRST, &amp;UCB0CTL1</a:t>
+            </a:r>
+          </a:p>
+          <a:p>
+            <a:pPr marL="0" indent="0">
+              <a:buNone/>
+              <a:tabLst>
+                <a:tab pos="231775" algn="l"/>
+              </a:tabLst>
+            </a:pPr>
+            <a:endParaRPr lang="en-US" sz="2000" dirty="0"/>
+          </a:p>
+          <a:p>
+            <a:pPr marL="0" indent="0">
+              <a:buNone/>
+            </a:pPr>
+            <a:endParaRPr lang="en-US" dirty="0"/>
           </a:p>
         </p:txBody>
       </p:sp>
     </p:spTree>
     <p:extLst>
       <p:ext uri="{BB962C8B-B14F-4D97-AF65-F5344CB8AC3E}">
-        <p14:creationId xmlns:p14="http://schemas.microsoft.com/office/powerpoint/2010/main" val="3618873361"/>
+        <p14:creationId xmlns:p14="http://schemas.microsoft.com/office/powerpoint/2010/main" val="4008139952"/>
       </p:ext>
     </p:extLst>
   </p:cSld>
   <p:clrMapOvr>
     <a:masterClrMapping/>
   </p:clrMapOvr>
+  <p:timing>
+    <p:tnLst>
+      <p:par>
+        <p:cTn id="1" dur="indefinite" restart="never" nodeType="tmRoot"/>
+      </p:par>
+    </p:tnLst>
+  </p:timing>
 </p:sld>
 </file>
 
@@ -4880,10 +4995,10 @@
           <a:lstStyle/>
           <a:p>
             <a:r>
-              <a:rPr lang="en-US" b="1" dirty="0" smtClean="0"/>
-              <a:t>Example  (loopback)</a:t>
-            </a:r>
-            <a:endParaRPr lang="en-US" dirty="0"/>
+              <a:rPr lang="en-US" sz="2400" b="1" dirty="0"/>
+              <a:t>Universal Serial Communication Interface (USCI)</a:t>
+            </a:r>
+            <a:endParaRPr lang="en-US" sz="2400" dirty="0"/>
           </a:p>
         </p:txBody>
       </p:sp>
@@ -4899,433 +5014,285 @@
         </p:nvSpPr>
         <p:spPr>
           <a:xfrm>
-            <a:off x="372616" y="774850"/>
-            <a:ext cx="8601452" cy="2818013"/>
+            <a:off x="596787" y="797065"/>
+            <a:ext cx="8215440" cy="4724400"/>
           </a:xfrm>
         </p:spPr>
         <p:txBody>
           <a:bodyPr/>
           <a:lstStyle/>
           <a:p>
+            <a:r>
+              <a:rPr lang="en-US" sz="2000" dirty="0" smtClean="0"/>
+              <a:t>Step 5</a:t>
+            </a:r>
+            <a:endParaRPr lang="en-US" sz="2000" dirty="0"/>
+          </a:p>
+          <a:p>
+            <a:pPr lvl="1"/>
+            <a:r>
+              <a:rPr lang="en-US" sz="1600" dirty="0" smtClean="0">
+                <a:solidFill>
+                  <a:schemeClr val="accent2"/>
+                </a:solidFill>
+              </a:rPr>
+              <a:t>Use </a:t>
+            </a:r>
+            <a:r>
+              <a:rPr lang="en-US" sz="1600" dirty="0">
+                <a:solidFill>
+                  <a:schemeClr val="accent2"/>
+                </a:solidFill>
+              </a:rPr>
+              <a:t>the subsystem</a:t>
+            </a:r>
+            <a:r>
+              <a:rPr lang="en-US" sz="1600" dirty="0" smtClean="0">
+                <a:solidFill>
+                  <a:schemeClr val="accent2"/>
+                </a:solidFill>
+              </a:rPr>
+              <a:t>! </a:t>
+            </a:r>
+          </a:p>
+          <a:p>
+            <a:pPr lvl="2"/>
+            <a:r>
+              <a:rPr lang="en-US" sz="1400" dirty="0"/>
+              <a:t>To send a byte, just write to the </a:t>
+            </a:r>
+            <a:r>
+              <a:rPr lang="en-US" sz="1400" dirty="0">
+                <a:solidFill>
+                  <a:schemeClr val="accent2"/>
+                </a:solidFill>
+              </a:rPr>
+              <a:t>TXBUF</a:t>
+            </a:r>
+            <a:r>
+              <a:rPr lang="en-US" sz="1400" dirty="0"/>
+              <a:t> register. </a:t>
+            </a:r>
+            <a:r>
+              <a:rPr lang="en-US" sz="1400" dirty="0" smtClean="0"/>
+              <a:t> [16.4.6]</a:t>
+            </a:r>
+          </a:p>
+          <a:p>
+            <a:pPr lvl="2"/>
+            <a:r>
+              <a:rPr lang="en-US" sz="1400" dirty="0" smtClean="0"/>
+              <a:t>To </a:t>
+            </a:r>
+            <a:r>
+              <a:rPr lang="en-US" sz="1400" dirty="0"/>
+              <a:t>read a received byte, read from the </a:t>
+            </a:r>
+            <a:r>
+              <a:rPr lang="en-US" sz="1400" dirty="0">
+                <a:solidFill>
+                  <a:schemeClr val="accent2"/>
+                </a:solidFill>
+              </a:rPr>
+              <a:t>RXBUF</a:t>
+            </a:r>
+            <a:r>
+              <a:rPr lang="en-US" sz="1400" dirty="0"/>
+              <a:t> register</a:t>
+            </a:r>
+            <a:r>
+              <a:rPr lang="en-US" sz="1400" dirty="0" smtClean="0"/>
+              <a:t>. </a:t>
+            </a:r>
+            <a:r>
+              <a:rPr lang="en-US" sz="1400" dirty="0"/>
+              <a:t>[</a:t>
+            </a:r>
+            <a:r>
+              <a:rPr lang="en-US" sz="1400" dirty="0" smtClean="0"/>
+              <a:t>16.4.7]</a:t>
+            </a:r>
+            <a:endParaRPr lang="en-US" sz="1400" dirty="0"/>
+          </a:p>
+          <a:p>
+            <a:pPr lvl="1"/>
+            <a:r>
+              <a:rPr lang="en-US" sz="1600" dirty="0" smtClean="0">
+                <a:solidFill>
+                  <a:schemeClr val="accent2"/>
+                </a:solidFill>
+              </a:rPr>
+              <a:t>How do  you know “you’ve got mail” or last transmission is done?</a:t>
+            </a:r>
+          </a:p>
+          <a:p>
+            <a:pPr lvl="2"/>
+            <a:r>
+              <a:rPr lang="en-US" sz="1400" dirty="0" smtClean="0"/>
+              <a:t>You've </a:t>
+            </a:r>
+            <a:r>
+              <a:rPr lang="en-US" sz="1400" dirty="0"/>
+              <a:t>got to monitor the flags in the </a:t>
+            </a:r>
+            <a:r>
+              <a:rPr lang="en-US" sz="1400" dirty="0">
+                <a:solidFill>
+                  <a:schemeClr val="accent2"/>
+                </a:solidFill>
+              </a:rPr>
+              <a:t>IFG2</a:t>
+            </a:r>
+            <a:r>
+              <a:rPr lang="en-US" sz="1400" dirty="0"/>
+              <a:t> register </a:t>
+            </a:r>
+            <a:r>
+              <a:rPr lang="en-US" sz="1400" dirty="0" smtClean="0"/>
+              <a:t>[16.4.9] to </a:t>
+            </a:r>
+            <a:r>
+              <a:rPr lang="en-US" sz="1400" dirty="0"/>
+              <a:t>know when it's safe the </a:t>
+            </a:r>
+            <a:r>
+              <a:rPr lang="en-US" sz="1400" dirty="0" smtClean="0"/>
+              <a:t>send</a:t>
+            </a:r>
+            <a:endParaRPr lang="en-US" sz="1400" dirty="0"/>
+          </a:p>
+          <a:p>
+            <a:pPr lvl="1"/>
+            <a:r>
+              <a:rPr lang="en-US" sz="1800" dirty="0" smtClean="0">
+                <a:solidFill>
+                  <a:schemeClr val="accent2"/>
+                </a:solidFill>
+              </a:rPr>
+              <a:t>TXIFG </a:t>
+            </a:r>
+          </a:p>
+          <a:p>
+            <a:pPr lvl="2"/>
+            <a:r>
+              <a:rPr lang="en-US" sz="1600" dirty="0" smtClean="0"/>
+              <a:t>Set </a:t>
+            </a:r>
+            <a:r>
+              <a:rPr lang="en-US" sz="1600" dirty="0"/>
+              <a:t>when </a:t>
+            </a:r>
+            <a:r>
+              <a:rPr lang="en-US" sz="1600" dirty="0">
+                <a:solidFill>
+                  <a:schemeClr val="accent2"/>
+                </a:solidFill>
+              </a:rPr>
+              <a:t>TXBUF</a:t>
+            </a:r>
+            <a:r>
+              <a:rPr lang="en-US" sz="1600" dirty="0"/>
+              <a:t> is ready for a byte</a:t>
+            </a:r>
+          </a:p>
+          <a:p>
+            <a:pPr lvl="2"/>
+            <a:r>
+              <a:rPr lang="en-US" sz="1600" dirty="0" smtClean="0"/>
+              <a:t>Cleared </a:t>
+            </a:r>
+            <a:r>
+              <a:rPr lang="en-US" sz="1600" dirty="0"/>
+              <a:t>on write</a:t>
+            </a:r>
+          </a:p>
+          <a:p>
+            <a:pPr lvl="2"/>
+            <a:r>
+              <a:rPr lang="en-US" sz="1600" dirty="0" smtClean="0"/>
+              <a:t>Just </a:t>
+            </a:r>
+            <a:r>
+              <a:rPr lang="en-US" sz="1600" dirty="0"/>
+              <a:t>because the TXBUF is ready for another byte doesn't mean that the transmission is complete! It's double-buffered!</a:t>
+            </a:r>
+          </a:p>
+          <a:p>
+            <a:pPr lvl="1"/>
+            <a:r>
+              <a:rPr lang="en-US" sz="1800" dirty="0" smtClean="0">
+                <a:solidFill>
+                  <a:schemeClr val="accent2"/>
+                </a:solidFill>
+              </a:rPr>
+              <a:t>RXIFG</a:t>
+            </a:r>
+          </a:p>
+          <a:p>
+            <a:pPr lvl="2"/>
+            <a:r>
+              <a:rPr lang="en-US" sz="1600" dirty="0" smtClean="0"/>
+              <a:t>Set </a:t>
+            </a:r>
+            <a:r>
+              <a:rPr lang="en-US" sz="1600" dirty="0"/>
+              <a:t>when </a:t>
+            </a:r>
+            <a:r>
+              <a:rPr lang="en-US" sz="1600" dirty="0">
+                <a:solidFill>
+                  <a:schemeClr val="accent2"/>
+                </a:solidFill>
+              </a:rPr>
+              <a:t>RXBUF</a:t>
+            </a:r>
+            <a:r>
+              <a:rPr lang="en-US" sz="1600" dirty="0"/>
+              <a:t> has received a complete character</a:t>
+            </a:r>
+          </a:p>
+          <a:p>
+            <a:pPr lvl="2"/>
+            <a:r>
+              <a:rPr lang="en-US" sz="1600" dirty="0" smtClean="0"/>
+              <a:t>Cleared </a:t>
+            </a:r>
+            <a:r>
+              <a:rPr lang="en-US" sz="1600" dirty="0"/>
+              <a:t>on read</a:t>
+            </a:r>
+          </a:p>
+          <a:p>
+            <a:pPr lvl="2"/>
+            <a:r>
+              <a:rPr lang="en-US" sz="1600" dirty="0" smtClean="0"/>
+              <a:t>This </a:t>
+            </a:r>
+            <a:r>
+              <a:rPr lang="en-US" sz="1600" dirty="0"/>
+              <a:t>is what you should monitor to determine a transmission has completed</a:t>
+            </a:r>
+            <a:r>
+              <a:rPr lang="en-US" sz="1600" dirty="0" smtClean="0"/>
+              <a:t>!</a:t>
+            </a:r>
+            <a:endParaRPr lang="en-US" sz="1600" dirty="0"/>
+          </a:p>
+          <a:p>
+            <a:endParaRPr lang="en-US" sz="2400" dirty="0" smtClean="0"/>
+          </a:p>
+          <a:p>
+            <a:endParaRPr lang="en-US" sz="2400" dirty="0" smtClean="0">
+              <a:solidFill>
+                <a:schemeClr val="accent2"/>
+              </a:solidFill>
+            </a:endParaRPr>
+          </a:p>
+          <a:p>
             <a:pPr marL="0" indent="0">
               <a:buNone/>
             </a:pPr>
-            <a:r>
-              <a:rPr lang="en-US" sz="1200" b="1" dirty="0">
-                <a:solidFill>
-                  <a:schemeClr val="accent2"/>
-                </a:solidFill>
-                <a:latin typeface="Courier New" pitchFamily="49" charset="0"/>
-                <a:cs typeface="Courier New" pitchFamily="49" charset="0"/>
-              </a:rPr>
-              <a:t> </a:t>
-            </a:r>
-            <a:r>
-              <a:rPr lang="en-US" sz="1200" b="1" dirty="0" smtClean="0">
-                <a:solidFill>
-                  <a:schemeClr val="accent2"/>
-                </a:solidFill>
-                <a:latin typeface="Courier New" pitchFamily="49" charset="0"/>
-                <a:cs typeface="Courier New" pitchFamily="49" charset="0"/>
-              </a:rPr>
-              <a:t>       </a:t>
-            </a:r>
-            <a:r>
-              <a:rPr lang="en-US" sz="1200" b="1" dirty="0" err="1" smtClean="0">
-                <a:solidFill>
-                  <a:schemeClr val="accent2"/>
-                </a:solidFill>
-                <a:latin typeface="Courier New" pitchFamily="49" charset="0"/>
-                <a:cs typeface="Courier New" pitchFamily="49" charset="0"/>
-              </a:rPr>
-              <a:t>bis.b</a:t>
-            </a:r>
-            <a:r>
-              <a:rPr lang="en-US" sz="1200" b="1" dirty="0" smtClean="0">
-                <a:solidFill>
-                  <a:schemeClr val="accent2"/>
-                </a:solidFill>
-                <a:latin typeface="Courier New" pitchFamily="49" charset="0"/>
-                <a:cs typeface="Courier New" pitchFamily="49" charset="0"/>
-              </a:rPr>
-              <a:t> </a:t>
-            </a:r>
-            <a:r>
-              <a:rPr lang="en-US" sz="1200" b="1" dirty="0">
-                <a:solidFill>
-                  <a:schemeClr val="accent2"/>
-                </a:solidFill>
-                <a:latin typeface="Courier New" pitchFamily="49" charset="0"/>
-                <a:cs typeface="Courier New" pitchFamily="49" charset="0"/>
-              </a:rPr>
-              <a:t>#UCSWRST, &amp;UCA0CTL1</a:t>
-            </a:r>
-          </a:p>
-          <a:p>
-            <a:pPr marL="0" indent="0">
-              <a:buNone/>
-            </a:pPr>
-            <a:r>
-              <a:rPr lang="en-US" sz="1200" b="1" dirty="0" smtClean="0">
-                <a:solidFill>
-                  <a:schemeClr val="accent2"/>
-                </a:solidFill>
-                <a:latin typeface="Courier New" pitchFamily="49" charset="0"/>
-                <a:cs typeface="Courier New" pitchFamily="49" charset="0"/>
-              </a:rPr>
-              <a:t>        </a:t>
-            </a:r>
-            <a:r>
-              <a:rPr lang="en-US" sz="1200" b="1" dirty="0" err="1">
-                <a:solidFill>
-                  <a:schemeClr val="accent2"/>
-                </a:solidFill>
-                <a:latin typeface="Courier New" pitchFamily="49" charset="0"/>
-                <a:cs typeface="Courier New" pitchFamily="49" charset="0"/>
-              </a:rPr>
-              <a:t>bis.b</a:t>
-            </a:r>
-            <a:r>
-              <a:rPr lang="en-US" sz="1200" b="1" dirty="0">
-                <a:solidFill>
-                  <a:schemeClr val="accent2"/>
-                </a:solidFill>
-                <a:latin typeface="Courier New" pitchFamily="49" charset="0"/>
-                <a:cs typeface="Courier New" pitchFamily="49" charset="0"/>
-              </a:rPr>
-              <a:t> #UCCKPL|UCMSB|UCMST|UCSYNC, &amp;UCA0CTL0     ; don't forget UCSYNC!</a:t>
-            </a:r>
-          </a:p>
-          <a:p>
-            <a:pPr marL="0" indent="0">
-              <a:buNone/>
-            </a:pPr>
-            <a:r>
-              <a:rPr lang="en-US" sz="1200" b="1" dirty="0" smtClean="0">
-                <a:solidFill>
-                  <a:schemeClr val="accent2"/>
-                </a:solidFill>
-                <a:latin typeface="Courier New" pitchFamily="49" charset="0"/>
-                <a:cs typeface="Courier New" pitchFamily="49" charset="0"/>
-              </a:rPr>
-              <a:t>        </a:t>
-            </a:r>
-            <a:r>
-              <a:rPr lang="en-US" sz="1200" b="1" dirty="0" err="1">
-                <a:solidFill>
-                  <a:schemeClr val="accent2"/>
-                </a:solidFill>
-                <a:latin typeface="Courier New" pitchFamily="49" charset="0"/>
-                <a:cs typeface="Courier New" pitchFamily="49" charset="0"/>
-              </a:rPr>
-              <a:t>bis.b</a:t>
-            </a:r>
-            <a:r>
-              <a:rPr lang="en-US" sz="1200" b="1" dirty="0">
-                <a:solidFill>
-                  <a:schemeClr val="accent2"/>
-                </a:solidFill>
-                <a:latin typeface="Courier New" pitchFamily="49" charset="0"/>
-                <a:cs typeface="Courier New" pitchFamily="49" charset="0"/>
-              </a:rPr>
-              <a:t> #UCSSEL1, &amp;UCA0CTL1                       ; select a clock to use!</a:t>
-            </a:r>
-          </a:p>
-          <a:p>
-            <a:pPr marL="0" indent="0">
-              <a:buNone/>
-            </a:pPr>
-            <a:r>
-              <a:rPr lang="en-US" sz="1200" b="1" dirty="0" smtClean="0">
-                <a:solidFill>
-                  <a:schemeClr val="accent2"/>
-                </a:solidFill>
-                <a:latin typeface="Courier New" pitchFamily="49" charset="0"/>
-                <a:cs typeface="Courier New" pitchFamily="49" charset="0"/>
-              </a:rPr>
-              <a:t>        </a:t>
-            </a:r>
-            <a:r>
-              <a:rPr lang="en-US" sz="1200" b="1" dirty="0" err="1">
-                <a:solidFill>
-                  <a:schemeClr val="accent2"/>
-                </a:solidFill>
-                <a:latin typeface="Courier New" pitchFamily="49" charset="0"/>
-                <a:cs typeface="Courier New" pitchFamily="49" charset="0"/>
-              </a:rPr>
-              <a:t>bis.b</a:t>
-            </a:r>
-            <a:r>
-              <a:rPr lang="en-US" sz="1200" b="1" dirty="0">
-                <a:solidFill>
-                  <a:schemeClr val="accent2"/>
-                </a:solidFill>
-                <a:latin typeface="Courier New" pitchFamily="49" charset="0"/>
-                <a:cs typeface="Courier New" pitchFamily="49" charset="0"/>
-              </a:rPr>
-              <a:t> #UCLISTEN, &amp;UCA0STAT                      ; enables internal loopback</a:t>
-            </a:r>
-          </a:p>
-          <a:p>
-            <a:pPr marL="0" indent="0">
-              <a:buNone/>
-            </a:pPr>
-            <a:r>
-              <a:rPr lang="en-US" sz="1200" b="1" dirty="0" smtClean="0">
-                <a:solidFill>
-                  <a:schemeClr val="accent2"/>
-                </a:solidFill>
-                <a:latin typeface="Courier New" pitchFamily="49" charset="0"/>
-                <a:cs typeface="Courier New" pitchFamily="49" charset="0"/>
-              </a:rPr>
-              <a:t>        </a:t>
-            </a:r>
-            <a:r>
-              <a:rPr lang="en-US" sz="1200" b="1" dirty="0" err="1">
-                <a:solidFill>
-                  <a:schemeClr val="accent2"/>
-                </a:solidFill>
-                <a:latin typeface="Courier New" pitchFamily="49" charset="0"/>
-                <a:cs typeface="Courier New" pitchFamily="49" charset="0"/>
-              </a:rPr>
-              <a:t>bis.b</a:t>
-            </a:r>
-            <a:r>
-              <a:rPr lang="en-US" sz="1200" b="1" dirty="0">
-                <a:solidFill>
-                  <a:schemeClr val="accent2"/>
-                </a:solidFill>
-                <a:latin typeface="Courier New" pitchFamily="49" charset="0"/>
-                <a:cs typeface="Courier New" pitchFamily="49" charset="0"/>
-              </a:rPr>
-              <a:t> #BIT4, &amp;P1SEL                             ; make UCA0CLK available on P1.4</a:t>
-            </a:r>
-          </a:p>
-          <a:p>
-            <a:pPr marL="0" indent="0">
-              <a:buNone/>
-            </a:pPr>
-            <a:r>
-              <a:rPr lang="en-US" sz="1200" b="1" dirty="0">
-                <a:solidFill>
-                  <a:schemeClr val="accent2"/>
-                </a:solidFill>
-                <a:latin typeface="Courier New" pitchFamily="49" charset="0"/>
-                <a:cs typeface="Courier New" pitchFamily="49" charset="0"/>
-              </a:rPr>
-              <a:t>        </a:t>
-            </a:r>
-            <a:r>
-              <a:rPr lang="en-US" sz="1200" b="1" dirty="0" err="1">
-                <a:solidFill>
-                  <a:schemeClr val="accent2"/>
-                </a:solidFill>
-                <a:latin typeface="Courier New" pitchFamily="49" charset="0"/>
-                <a:cs typeface="Courier New" pitchFamily="49" charset="0"/>
-              </a:rPr>
-              <a:t>bis.b</a:t>
-            </a:r>
-            <a:r>
-              <a:rPr lang="en-US" sz="1200" b="1" dirty="0">
-                <a:solidFill>
-                  <a:schemeClr val="accent2"/>
-                </a:solidFill>
-                <a:latin typeface="Courier New" pitchFamily="49" charset="0"/>
-                <a:cs typeface="Courier New" pitchFamily="49" charset="0"/>
-              </a:rPr>
-              <a:t> #BIT4, &amp;P1SEL2</a:t>
-            </a:r>
-          </a:p>
-          <a:p>
-            <a:pPr marL="0" indent="0">
-              <a:buNone/>
-            </a:pPr>
-            <a:r>
-              <a:rPr lang="en-US" sz="1200" b="1" dirty="0" smtClean="0">
-                <a:solidFill>
-                  <a:schemeClr val="accent2"/>
-                </a:solidFill>
-                <a:latin typeface="Courier New" pitchFamily="49" charset="0"/>
-                <a:cs typeface="Courier New" pitchFamily="49" charset="0"/>
-              </a:rPr>
-              <a:t>        </a:t>
-            </a:r>
-            <a:r>
-              <a:rPr lang="en-US" sz="1200" b="1" dirty="0" err="1">
-                <a:solidFill>
-                  <a:schemeClr val="accent2"/>
-                </a:solidFill>
-                <a:latin typeface="Courier New" pitchFamily="49" charset="0"/>
-                <a:cs typeface="Courier New" pitchFamily="49" charset="0"/>
-              </a:rPr>
-              <a:t>bis.b</a:t>
-            </a:r>
-            <a:r>
-              <a:rPr lang="en-US" sz="1200" b="1" dirty="0">
-                <a:solidFill>
-                  <a:schemeClr val="accent2"/>
-                </a:solidFill>
-                <a:latin typeface="Courier New" pitchFamily="49" charset="0"/>
-                <a:cs typeface="Courier New" pitchFamily="49" charset="0"/>
-              </a:rPr>
-              <a:t> #BIT2, &amp;P1SEL                             ; make UCA0SSIMO available on P1.2</a:t>
-            </a:r>
-          </a:p>
-          <a:p>
-            <a:pPr marL="0" indent="0">
-              <a:buNone/>
-            </a:pPr>
-            <a:r>
-              <a:rPr lang="en-US" sz="1200" b="1" dirty="0">
-                <a:solidFill>
-                  <a:schemeClr val="accent2"/>
-                </a:solidFill>
-                <a:latin typeface="Courier New" pitchFamily="49" charset="0"/>
-                <a:cs typeface="Courier New" pitchFamily="49" charset="0"/>
-              </a:rPr>
-              <a:t>        </a:t>
-            </a:r>
-            <a:r>
-              <a:rPr lang="en-US" sz="1200" b="1" dirty="0" err="1">
-                <a:solidFill>
-                  <a:schemeClr val="accent2"/>
-                </a:solidFill>
-                <a:latin typeface="Courier New" pitchFamily="49" charset="0"/>
-                <a:cs typeface="Courier New" pitchFamily="49" charset="0"/>
-              </a:rPr>
-              <a:t>bis.b</a:t>
-            </a:r>
-            <a:r>
-              <a:rPr lang="en-US" sz="1200" b="1" dirty="0">
-                <a:solidFill>
-                  <a:schemeClr val="accent2"/>
-                </a:solidFill>
-                <a:latin typeface="Courier New" pitchFamily="49" charset="0"/>
-                <a:cs typeface="Courier New" pitchFamily="49" charset="0"/>
-              </a:rPr>
-              <a:t> #BIT2, &amp;P1SEL2</a:t>
-            </a:r>
-          </a:p>
-          <a:p>
-            <a:pPr marL="0" indent="0">
-              <a:buNone/>
-            </a:pPr>
-            <a:r>
-              <a:rPr lang="en-US" sz="1200" b="1" dirty="0" smtClean="0">
-                <a:solidFill>
-                  <a:schemeClr val="accent2"/>
-                </a:solidFill>
-                <a:latin typeface="Courier New" pitchFamily="49" charset="0"/>
-                <a:cs typeface="Courier New" pitchFamily="49" charset="0"/>
-              </a:rPr>
-              <a:t>        </a:t>
-            </a:r>
-            <a:r>
-              <a:rPr lang="en-US" sz="1200" b="1" dirty="0" err="1">
-                <a:solidFill>
-                  <a:schemeClr val="accent2"/>
-                </a:solidFill>
-                <a:latin typeface="Courier New" pitchFamily="49" charset="0"/>
-                <a:cs typeface="Courier New" pitchFamily="49" charset="0"/>
-              </a:rPr>
-              <a:t>bis.b</a:t>
-            </a:r>
-            <a:r>
-              <a:rPr lang="en-US" sz="1200" b="1" dirty="0">
-                <a:solidFill>
-                  <a:schemeClr val="accent2"/>
-                </a:solidFill>
-                <a:latin typeface="Courier New" pitchFamily="49" charset="0"/>
-                <a:cs typeface="Courier New" pitchFamily="49" charset="0"/>
-              </a:rPr>
-              <a:t> #BIT1, &amp;P1SEL                             ; make UCA0SSOMI available on P1.1</a:t>
-            </a:r>
-          </a:p>
-          <a:p>
-            <a:pPr marL="0" indent="0">
-              <a:buNone/>
-            </a:pPr>
-            <a:r>
-              <a:rPr lang="en-US" sz="1200" b="1" dirty="0">
-                <a:solidFill>
-                  <a:schemeClr val="accent2"/>
-                </a:solidFill>
-                <a:latin typeface="Courier New" pitchFamily="49" charset="0"/>
-                <a:cs typeface="Courier New" pitchFamily="49" charset="0"/>
-              </a:rPr>
-              <a:t>        </a:t>
-            </a:r>
-            <a:r>
-              <a:rPr lang="en-US" sz="1200" b="1" dirty="0" err="1">
-                <a:solidFill>
-                  <a:schemeClr val="accent2"/>
-                </a:solidFill>
-                <a:latin typeface="Courier New" pitchFamily="49" charset="0"/>
-                <a:cs typeface="Courier New" pitchFamily="49" charset="0"/>
-              </a:rPr>
-              <a:t>bis.b</a:t>
-            </a:r>
-            <a:r>
-              <a:rPr lang="en-US" sz="1200" b="1" dirty="0">
-                <a:solidFill>
-                  <a:schemeClr val="accent2"/>
-                </a:solidFill>
-                <a:latin typeface="Courier New" pitchFamily="49" charset="0"/>
-                <a:cs typeface="Courier New" pitchFamily="49" charset="0"/>
-              </a:rPr>
-              <a:t> #BIT1, &amp;P1SEL2</a:t>
-            </a:r>
-          </a:p>
-          <a:p>
-            <a:pPr marL="0" indent="0">
-              <a:buNone/>
-            </a:pPr>
-            <a:r>
-              <a:rPr lang="en-US" sz="1200" b="1" dirty="0" smtClean="0">
-                <a:solidFill>
-                  <a:schemeClr val="accent2"/>
-                </a:solidFill>
-                <a:latin typeface="Courier New" pitchFamily="49" charset="0"/>
-                <a:cs typeface="Courier New" pitchFamily="49" charset="0"/>
-              </a:rPr>
-              <a:t>        </a:t>
-            </a:r>
-            <a:r>
-              <a:rPr lang="en-US" sz="1200" b="1" dirty="0" err="1">
-                <a:solidFill>
-                  <a:schemeClr val="accent2"/>
-                </a:solidFill>
-                <a:latin typeface="Courier New" pitchFamily="49" charset="0"/>
-                <a:cs typeface="Courier New" pitchFamily="49" charset="0"/>
-              </a:rPr>
-              <a:t>bic.b</a:t>
-            </a:r>
-            <a:r>
-              <a:rPr lang="en-US" sz="1200" b="1" dirty="0">
-                <a:solidFill>
-                  <a:schemeClr val="accent2"/>
-                </a:solidFill>
-                <a:latin typeface="Courier New" pitchFamily="49" charset="0"/>
-                <a:cs typeface="Courier New" pitchFamily="49" charset="0"/>
-              </a:rPr>
-              <a:t> #UCSWRST, &amp;UCA0CTL1                       ; enable </a:t>
-            </a:r>
-            <a:r>
-              <a:rPr lang="en-US" sz="1200" b="1" dirty="0" smtClean="0">
-                <a:solidFill>
-                  <a:schemeClr val="accent2"/>
-                </a:solidFill>
-                <a:latin typeface="Courier New" pitchFamily="49" charset="0"/>
-                <a:cs typeface="Courier New" pitchFamily="49" charset="0"/>
-              </a:rPr>
-              <a:t>subsystem</a:t>
-            </a:r>
-          </a:p>
-          <a:p>
-            <a:pPr marL="0" indent="0">
-              <a:buNone/>
-            </a:pPr>
-            <a:endParaRPr lang="en-US" sz="1200" b="1" dirty="0">
+            <a:endParaRPr lang="en-US" sz="1400" dirty="0">
               <a:solidFill>
                 <a:schemeClr val="accent2"/>
               </a:solidFill>
@@ -5337,343 +5304,27 @@
             <a:pPr marL="0" indent="0">
               <a:buNone/>
             </a:pPr>
-            <a:r>
-              <a:rPr lang="en-US" sz="1200" b="1" dirty="0" smtClean="0">
-                <a:solidFill>
-                  <a:schemeClr val="accent2"/>
-                </a:solidFill>
-                <a:latin typeface="Courier New" pitchFamily="49" charset="0"/>
-                <a:cs typeface="Courier New" pitchFamily="49" charset="0"/>
-              </a:rPr>
-              <a:t>send    </a:t>
-            </a:r>
-            <a:r>
-              <a:rPr lang="en-US" sz="1200" b="1" dirty="0" err="1">
-                <a:solidFill>
-                  <a:schemeClr val="accent2"/>
-                </a:solidFill>
-                <a:latin typeface="Courier New" pitchFamily="49" charset="0"/>
-                <a:cs typeface="Courier New" pitchFamily="49" charset="0"/>
-              </a:rPr>
-              <a:t>mov.b</a:t>
-            </a:r>
-            <a:r>
-              <a:rPr lang="en-US" sz="1200" b="1" dirty="0">
-                <a:solidFill>
-                  <a:schemeClr val="accent2"/>
-                </a:solidFill>
-                <a:latin typeface="Courier New" pitchFamily="49" charset="0"/>
-                <a:cs typeface="Courier New" pitchFamily="49" charset="0"/>
-              </a:rPr>
-              <a:t> #0xBB, &amp;</a:t>
-            </a:r>
-            <a:r>
-              <a:rPr lang="en-US" sz="1200" b="1" dirty="0" smtClean="0">
-                <a:solidFill>
-                  <a:schemeClr val="accent2"/>
-                </a:solidFill>
-                <a:latin typeface="Courier New" pitchFamily="49" charset="0"/>
-                <a:cs typeface="Courier New" pitchFamily="49" charset="0"/>
-              </a:rPr>
-              <a:t>UCA0TXBUF          ; </a:t>
-            </a:r>
-            <a:r>
-              <a:rPr lang="en-US" sz="1200" b="1" dirty="0">
-                <a:solidFill>
-                  <a:schemeClr val="accent2"/>
-                </a:solidFill>
-                <a:latin typeface="Courier New" pitchFamily="49" charset="0"/>
-                <a:cs typeface="Courier New" pitchFamily="49" charset="0"/>
-              </a:rPr>
-              <a:t>place a byte in the TX buffer</a:t>
-            </a:r>
-          </a:p>
-          <a:p>
-            <a:pPr marL="0" indent="0">
-              <a:buNone/>
-            </a:pPr>
-            <a:r>
-              <a:rPr lang="en-US" sz="1200" b="1" dirty="0" smtClean="0">
-                <a:solidFill>
-                  <a:schemeClr val="accent2"/>
-                </a:solidFill>
-                <a:latin typeface="Courier New" pitchFamily="49" charset="0"/>
-                <a:cs typeface="Courier New" pitchFamily="49" charset="0"/>
-              </a:rPr>
-              <a:t>wait    </a:t>
-            </a:r>
-            <a:r>
-              <a:rPr lang="en-US" sz="1200" b="1" dirty="0" err="1">
-                <a:solidFill>
-                  <a:schemeClr val="accent2"/>
-                </a:solidFill>
-                <a:latin typeface="Courier New" pitchFamily="49" charset="0"/>
-                <a:cs typeface="Courier New" pitchFamily="49" charset="0"/>
-              </a:rPr>
-              <a:t>bit.b</a:t>
-            </a:r>
-            <a:r>
-              <a:rPr lang="en-US" sz="1200" b="1" dirty="0">
-                <a:solidFill>
-                  <a:schemeClr val="accent2"/>
-                </a:solidFill>
-                <a:latin typeface="Courier New" pitchFamily="49" charset="0"/>
-                <a:cs typeface="Courier New" pitchFamily="49" charset="0"/>
-              </a:rPr>
-              <a:t> </a:t>
-            </a:r>
-            <a:r>
-              <a:rPr lang="en-US" sz="1200" b="1" dirty="0" smtClean="0">
-                <a:solidFill>
-                  <a:schemeClr val="accent2"/>
-                </a:solidFill>
-                <a:latin typeface="Courier New" pitchFamily="49" charset="0"/>
-                <a:cs typeface="Courier New" pitchFamily="49" charset="0"/>
-              </a:rPr>
-              <a:t>#</a:t>
-            </a:r>
-            <a:r>
-              <a:rPr lang="en-US" sz="1200" b="1" dirty="0">
-                <a:solidFill>
-                  <a:schemeClr val="accent2"/>
-                </a:solidFill>
-                <a:latin typeface="Courier New" pitchFamily="49" charset="0"/>
-                <a:cs typeface="Courier New" pitchFamily="49" charset="0"/>
-              </a:rPr>
-              <a:t>UCA0RXIFG, &amp;</a:t>
-            </a:r>
-            <a:r>
-              <a:rPr lang="en-US" sz="1200" b="1" dirty="0" smtClean="0">
-                <a:solidFill>
-                  <a:schemeClr val="accent2"/>
-                </a:solidFill>
-                <a:latin typeface="Courier New" pitchFamily="49" charset="0"/>
-                <a:cs typeface="Courier New" pitchFamily="49" charset="0"/>
-              </a:rPr>
-              <a:t>IFG2          </a:t>
-            </a:r>
-            <a:r>
-              <a:rPr lang="en-US" sz="1000" b="1" dirty="0" smtClean="0">
-                <a:solidFill>
-                  <a:schemeClr val="accent2"/>
-                </a:solidFill>
-                <a:latin typeface="Courier New" pitchFamily="49" charset="0"/>
-                <a:cs typeface="Courier New" pitchFamily="49" charset="0"/>
-              </a:rPr>
-              <a:t>; </a:t>
-            </a:r>
-            <a:r>
-              <a:rPr lang="en-US" sz="1000" b="1" dirty="0">
-                <a:solidFill>
-                  <a:schemeClr val="accent2"/>
-                </a:solidFill>
-                <a:latin typeface="Courier New" pitchFamily="49" charset="0"/>
-                <a:cs typeface="Courier New" pitchFamily="49" charset="0"/>
-              </a:rPr>
-              <a:t>wait for receive flag to be set (operation complete)</a:t>
-            </a:r>
-          </a:p>
-          <a:p>
-            <a:pPr marL="0" indent="0">
-              <a:buNone/>
-            </a:pPr>
-            <a:r>
-              <a:rPr lang="en-US" sz="1200" b="1" dirty="0">
-                <a:solidFill>
-                  <a:schemeClr val="accent2"/>
-                </a:solidFill>
-                <a:latin typeface="Courier New" pitchFamily="49" charset="0"/>
-                <a:cs typeface="Courier New" pitchFamily="49" charset="0"/>
-              </a:rPr>
-              <a:t>        </a:t>
-            </a:r>
-            <a:r>
-              <a:rPr lang="en-US" sz="1200" b="1" dirty="0" err="1">
-                <a:solidFill>
-                  <a:schemeClr val="accent2"/>
-                </a:solidFill>
-                <a:latin typeface="Courier New" pitchFamily="49" charset="0"/>
-                <a:cs typeface="Courier New" pitchFamily="49" charset="0"/>
-              </a:rPr>
-              <a:t>jz</a:t>
-            </a:r>
-            <a:r>
-              <a:rPr lang="en-US" sz="1200" b="1" dirty="0">
-                <a:solidFill>
-                  <a:schemeClr val="accent2"/>
-                </a:solidFill>
-                <a:latin typeface="Courier New" pitchFamily="49" charset="0"/>
-                <a:cs typeface="Courier New" pitchFamily="49" charset="0"/>
-              </a:rPr>
-              <a:t>    </a:t>
-            </a:r>
-            <a:r>
-              <a:rPr lang="en-US" sz="1200" b="1" dirty="0" smtClean="0">
-                <a:solidFill>
-                  <a:schemeClr val="accent2"/>
-                </a:solidFill>
-                <a:latin typeface="Courier New" pitchFamily="49" charset="0"/>
-                <a:cs typeface="Courier New" pitchFamily="49" charset="0"/>
-              </a:rPr>
-              <a:t>wait</a:t>
-            </a:r>
-            <a:endParaRPr lang="en-US" sz="1200" b="1" dirty="0">
-              <a:solidFill>
-                <a:schemeClr val="accent2"/>
-              </a:solidFill>
-              <a:latin typeface="Courier New" pitchFamily="49" charset="0"/>
-              <a:cs typeface="Courier New" pitchFamily="49" charset="0"/>
-            </a:endParaRPr>
-          </a:p>
-          <a:p>
-            <a:pPr marL="0" indent="0">
-              <a:buNone/>
-            </a:pPr>
-            <a:r>
-              <a:rPr lang="en-US" sz="1200" b="1" dirty="0" smtClean="0">
-                <a:solidFill>
-                  <a:schemeClr val="accent2"/>
-                </a:solidFill>
-                <a:latin typeface="Courier New" pitchFamily="49" charset="0"/>
-                <a:cs typeface="Courier New" pitchFamily="49" charset="0"/>
-              </a:rPr>
-              <a:t>        </a:t>
-            </a:r>
-            <a:r>
-              <a:rPr lang="en-US" sz="1200" b="1" dirty="0" err="1">
-                <a:solidFill>
-                  <a:schemeClr val="accent2"/>
-                </a:solidFill>
-                <a:latin typeface="Courier New" pitchFamily="49" charset="0"/>
-                <a:cs typeface="Courier New" pitchFamily="49" charset="0"/>
-              </a:rPr>
-              <a:t>mov.b</a:t>
-            </a:r>
-            <a:r>
-              <a:rPr lang="en-US" sz="1200" b="1" dirty="0">
-                <a:solidFill>
-                  <a:schemeClr val="accent2"/>
-                </a:solidFill>
-                <a:latin typeface="Courier New" pitchFamily="49" charset="0"/>
-                <a:cs typeface="Courier New" pitchFamily="49" charset="0"/>
-              </a:rPr>
-              <a:t> </a:t>
-            </a:r>
-            <a:r>
-              <a:rPr lang="en-US" sz="1200" b="1" dirty="0" smtClean="0">
-                <a:solidFill>
-                  <a:schemeClr val="accent2"/>
-                </a:solidFill>
-                <a:latin typeface="Courier New" pitchFamily="49" charset="0"/>
-                <a:cs typeface="Courier New" pitchFamily="49" charset="0"/>
-              </a:rPr>
-              <a:t>&amp;</a:t>
-            </a:r>
-            <a:r>
-              <a:rPr lang="en-US" sz="1200" b="1" dirty="0">
-                <a:solidFill>
-                  <a:schemeClr val="accent2"/>
-                </a:solidFill>
-                <a:latin typeface="Courier New" pitchFamily="49" charset="0"/>
-                <a:cs typeface="Courier New" pitchFamily="49" charset="0"/>
-              </a:rPr>
-              <a:t>UCA0RXBUF, </a:t>
-            </a:r>
-            <a:r>
-              <a:rPr lang="en-US" sz="1200" b="1" dirty="0" smtClean="0">
-                <a:solidFill>
-                  <a:schemeClr val="accent2"/>
-                </a:solidFill>
-                <a:latin typeface="Courier New" pitchFamily="49" charset="0"/>
-                <a:cs typeface="Courier New" pitchFamily="49" charset="0"/>
-              </a:rPr>
-              <a:t>r4             ; </a:t>
-            </a:r>
-            <a:r>
-              <a:rPr lang="en-US" sz="1200" b="1" dirty="0">
-                <a:solidFill>
-                  <a:schemeClr val="accent2"/>
-                </a:solidFill>
-                <a:latin typeface="Courier New" pitchFamily="49" charset="0"/>
-                <a:cs typeface="Courier New" pitchFamily="49" charset="0"/>
-              </a:rPr>
-              <a:t>read RX buffer to clear flag</a:t>
-            </a:r>
-          </a:p>
-          <a:p>
-            <a:pPr marL="0" indent="0">
-              <a:buNone/>
-            </a:pPr>
-            <a:r>
-              <a:rPr lang="en-US" sz="1200" b="1" dirty="0">
-                <a:solidFill>
-                  <a:schemeClr val="accent2"/>
-                </a:solidFill>
-                <a:latin typeface="Courier New" pitchFamily="49" charset="0"/>
-                <a:cs typeface="Courier New" pitchFamily="49" charset="0"/>
-              </a:rPr>
-              <a:t>        </a:t>
-            </a:r>
-            <a:r>
-              <a:rPr lang="en-US" sz="1200" b="1" dirty="0" err="1">
-                <a:solidFill>
-                  <a:schemeClr val="accent2"/>
-                </a:solidFill>
-                <a:latin typeface="Courier New" pitchFamily="49" charset="0"/>
-                <a:cs typeface="Courier New" pitchFamily="49" charset="0"/>
-              </a:rPr>
-              <a:t>jmp</a:t>
-            </a:r>
-            <a:r>
-              <a:rPr lang="en-US" sz="1200" b="1" dirty="0">
-                <a:solidFill>
-                  <a:schemeClr val="accent2"/>
-                </a:solidFill>
-                <a:latin typeface="Courier New" pitchFamily="49" charset="0"/>
-                <a:cs typeface="Courier New" pitchFamily="49" charset="0"/>
-              </a:rPr>
-              <a:t>    </a:t>
-            </a:r>
-            <a:r>
-              <a:rPr lang="en-US" sz="1200" b="1" dirty="0" smtClean="0">
-                <a:solidFill>
-                  <a:schemeClr val="accent2"/>
-                </a:solidFill>
-                <a:latin typeface="Courier New" pitchFamily="49" charset="0"/>
-                <a:cs typeface="Courier New" pitchFamily="49" charset="0"/>
-              </a:rPr>
-              <a:t>send                      ; </a:t>
-            </a:r>
-            <a:r>
-              <a:rPr lang="en-US" sz="1200" b="1" dirty="0">
-                <a:solidFill>
-                  <a:schemeClr val="accent2"/>
-                </a:solidFill>
-                <a:latin typeface="Courier New" pitchFamily="49" charset="0"/>
-                <a:cs typeface="Courier New" pitchFamily="49" charset="0"/>
-              </a:rPr>
-              <a:t>send another byte</a:t>
-            </a:r>
-            <a:endParaRPr lang="en-US" sz="1200" b="1" dirty="0">
-              <a:solidFill>
-                <a:schemeClr val="accent2"/>
-              </a:solidFill>
-              <a:latin typeface="Courier New" pitchFamily="49" charset="0"/>
-              <a:cs typeface="Courier New" pitchFamily="49" charset="0"/>
-            </a:endParaRPr>
+            <a:endParaRPr lang="en-US" sz="1400" dirty="0"/>
           </a:p>
         </p:txBody>
       </p:sp>
     </p:spTree>
     <p:extLst>
       <p:ext uri="{BB962C8B-B14F-4D97-AF65-F5344CB8AC3E}">
-        <p14:creationId xmlns:p14="http://schemas.microsoft.com/office/powerpoint/2010/main" val="1020724423"/>
+        <p14:creationId xmlns:p14="http://schemas.microsoft.com/office/powerpoint/2010/main" val="3618873361"/>
       </p:ext>
     </p:extLst>
   </p:cSld>
   <p:clrMapOvr>
     <a:masterClrMapping/>
   </p:clrMapOvr>
+  <p:timing>
+    <p:tnLst>
+      <p:par>
+        <p:cTn id="1" dur="indefinite" restart="never" nodeType="tmRoot"/>
+      </p:par>
+    </p:tnLst>
+  </p:timing>
 </p:sld>
 </file>
 
@@ -5711,7 +5362,7 @@
           <a:p>
             <a:r>
               <a:rPr lang="en-US" b="1" dirty="0" smtClean="0"/>
-              <a:t>Logic Analyzer</a:t>
+              <a:t>Example  (loopback)</a:t>
             </a:r>
             <a:endParaRPr lang="en-US" dirty="0"/>
           </a:p>
@@ -5729,95 +5380,768 @@
         </p:nvSpPr>
         <p:spPr>
           <a:xfrm>
-            <a:off x="395177" y="669852"/>
-            <a:ext cx="8493642" cy="4724400"/>
+            <a:off x="372616" y="774850"/>
+            <a:ext cx="8601452" cy="2818013"/>
           </a:xfrm>
         </p:spPr>
         <p:txBody>
           <a:bodyPr/>
           <a:lstStyle/>
           <a:p>
-            <a:r>
-              <a:rPr lang="en-US" sz="1600" dirty="0" smtClean="0"/>
-              <a:t>Sending 0xBB once  (0x1011 1011)      </a:t>
-            </a:r>
-            <a:r>
-              <a:rPr lang="en-US" sz="1600" dirty="0" smtClean="0">
-                <a:solidFill>
-                  <a:schemeClr val="accent2"/>
-                </a:solidFill>
-              </a:rPr>
-              <a:t>[MSB first!]</a:t>
-            </a:r>
-          </a:p>
-          <a:p>
-            <a:pPr lvl="1"/>
-            <a:r>
-              <a:rPr lang="en-US" sz="1200" dirty="0"/>
-              <a:t>Note how the clock default state is high and data is read on the second clock edge - consistent with our settings.</a:t>
-            </a:r>
-            <a:endParaRPr lang="en-US" sz="1200" dirty="0"/>
+            <a:pPr marL="0" indent="0">
+              <a:buNone/>
+            </a:pPr>
+            <a:r>
+              <a:rPr lang="en-US" sz="1200" b="1" dirty="0">
+                <a:solidFill>
+                  <a:schemeClr val="accent2"/>
+                </a:solidFill>
+                <a:latin typeface="Courier New" pitchFamily="49" charset="0"/>
+                <a:cs typeface="Courier New" pitchFamily="49" charset="0"/>
+              </a:rPr>
+              <a:t> </a:t>
+            </a:r>
+            <a:r>
+              <a:rPr lang="en-US" sz="1200" b="1" dirty="0" smtClean="0">
+                <a:solidFill>
+                  <a:schemeClr val="accent2"/>
+                </a:solidFill>
+                <a:latin typeface="Courier New" pitchFamily="49" charset="0"/>
+                <a:cs typeface="Courier New" pitchFamily="49" charset="0"/>
+              </a:rPr>
+              <a:t>       </a:t>
+            </a:r>
+            <a:r>
+              <a:rPr lang="en-US" sz="1200" b="1" dirty="0" err="1" smtClean="0">
+                <a:solidFill>
+                  <a:schemeClr val="accent2"/>
+                </a:solidFill>
+                <a:latin typeface="Courier New" pitchFamily="49" charset="0"/>
+                <a:cs typeface="Courier New" pitchFamily="49" charset="0"/>
+              </a:rPr>
+              <a:t>bis.b</a:t>
+            </a:r>
+            <a:r>
+              <a:rPr lang="en-US" sz="1200" b="1" dirty="0" smtClean="0">
+                <a:solidFill>
+                  <a:schemeClr val="accent2"/>
+                </a:solidFill>
+                <a:latin typeface="Courier New" pitchFamily="49" charset="0"/>
+                <a:cs typeface="Courier New" pitchFamily="49" charset="0"/>
+              </a:rPr>
+              <a:t> </a:t>
+            </a:r>
+            <a:r>
+              <a:rPr lang="en-US" sz="1200" b="1" dirty="0">
+                <a:solidFill>
+                  <a:schemeClr val="accent2"/>
+                </a:solidFill>
+                <a:latin typeface="Courier New" pitchFamily="49" charset="0"/>
+                <a:cs typeface="Courier New" pitchFamily="49" charset="0"/>
+              </a:rPr>
+              <a:t>#UCSWRST, &amp;UCA0CTL1</a:t>
+            </a:r>
+          </a:p>
+          <a:p>
+            <a:pPr marL="0" indent="0">
+              <a:buNone/>
+            </a:pPr>
+            <a:r>
+              <a:rPr lang="en-US" sz="1200" b="1" dirty="0" smtClean="0">
+                <a:solidFill>
+                  <a:schemeClr val="accent2"/>
+                </a:solidFill>
+                <a:latin typeface="Courier New" pitchFamily="49" charset="0"/>
+                <a:cs typeface="Courier New" pitchFamily="49" charset="0"/>
+              </a:rPr>
+              <a:t>        </a:t>
+            </a:r>
+            <a:r>
+              <a:rPr lang="en-US" sz="1200" b="1" dirty="0" err="1">
+                <a:solidFill>
+                  <a:schemeClr val="accent2"/>
+                </a:solidFill>
+                <a:latin typeface="Courier New" pitchFamily="49" charset="0"/>
+                <a:cs typeface="Courier New" pitchFamily="49" charset="0"/>
+              </a:rPr>
+              <a:t>bis.b</a:t>
+            </a:r>
+            <a:r>
+              <a:rPr lang="en-US" sz="1200" b="1" dirty="0">
+                <a:solidFill>
+                  <a:schemeClr val="accent2"/>
+                </a:solidFill>
+                <a:latin typeface="Courier New" pitchFamily="49" charset="0"/>
+                <a:cs typeface="Courier New" pitchFamily="49" charset="0"/>
+              </a:rPr>
+              <a:t> #UCCKPL|UCMSB|UCMST|UCSYNC, &amp;UCA0CTL0     ; don't forget UCSYNC!</a:t>
+            </a:r>
+          </a:p>
+          <a:p>
+            <a:pPr marL="0" indent="0">
+              <a:buNone/>
+            </a:pPr>
+            <a:r>
+              <a:rPr lang="en-US" sz="1200" b="1" dirty="0" smtClean="0">
+                <a:solidFill>
+                  <a:schemeClr val="accent2"/>
+                </a:solidFill>
+                <a:latin typeface="Courier New" pitchFamily="49" charset="0"/>
+                <a:cs typeface="Courier New" pitchFamily="49" charset="0"/>
+              </a:rPr>
+              <a:t>        </a:t>
+            </a:r>
+            <a:r>
+              <a:rPr lang="en-US" sz="1200" b="1" dirty="0" err="1">
+                <a:solidFill>
+                  <a:schemeClr val="accent2"/>
+                </a:solidFill>
+                <a:latin typeface="Courier New" pitchFamily="49" charset="0"/>
+                <a:cs typeface="Courier New" pitchFamily="49" charset="0"/>
+              </a:rPr>
+              <a:t>bis.b</a:t>
+            </a:r>
+            <a:r>
+              <a:rPr lang="en-US" sz="1200" b="1" dirty="0">
+                <a:solidFill>
+                  <a:schemeClr val="accent2"/>
+                </a:solidFill>
+                <a:latin typeface="Courier New" pitchFamily="49" charset="0"/>
+                <a:cs typeface="Courier New" pitchFamily="49" charset="0"/>
+              </a:rPr>
+              <a:t> #UCSSEL1, &amp;UCA0CTL1                       ; select a clock to use!</a:t>
+            </a:r>
+          </a:p>
+          <a:p>
+            <a:pPr marL="0" indent="0">
+              <a:buNone/>
+            </a:pPr>
+            <a:r>
+              <a:rPr lang="en-US" sz="1200" b="1" dirty="0" smtClean="0">
+                <a:solidFill>
+                  <a:schemeClr val="accent2"/>
+                </a:solidFill>
+                <a:latin typeface="Courier New" pitchFamily="49" charset="0"/>
+                <a:cs typeface="Courier New" pitchFamily="49" charset="0"/>
+              </a:rPr>
+              <a:t>        </a:t>
+            </a:r>
+            <a:r>
+              <a:rPr lang="en-US" sz="1200" b="1" dirty="0" err="1">
+                <a:solidFill>
+                  <a:schemeClr val="accent2"/>
+                </a:solidFill>
+                <a:latin typeface="Courier New" pitchFamily="49" charset="0"/>
+                <a:cs typeface="Courier New" pitchFamily="49" charset="0"/>
+              </a:rPr>
+              <a:t>bis.b</a:t>
+            </a:r>
+            <a:r>
+              <a:rPr lang="en-US" sz="1200" b="1" dirty="0">
+                <a:solidFill>
+                  <a:schemeClr val="accent2"/>
+                </a:solidFill>
+                <a:latin typeface="Courier New" pitchFamily="49" charset="0"/>
+                <a:cs typeface="Courier New" pitchFamily="49" charset="0"/>
+              </a:rPr>
+              <a:t> #UCLISTEN, &amp;UCA0STAT                      ; enables internal loopback</a:t>
+            </a:r>
+          </a:p>
+          <a:p>
+            <a:pPr marL="0" indent="0">
+              <a:buNone/>
+            </a:pPr>
+            <a:r>
+              <a:rPr lang="en-US" sz="1200" b="1" dirty="0" smtClean="0">
+                <a:solidFill>
+                  <a:schemeClr val="accent2"/>
+                </a:solidFill>
+                <a:latin typeface="Courier New" pitchFamily="49" charset="0"/>
+                <a:cs typeface="Courier New" pitchFamily="49" charset="0"/>
+              </a:rPr>
+              <a:t>        </a:t>
+            </a:r>
+            <a:r>
+              <a:rPr lang="en-US" sz="1200" b="1" dirty="0" err="1">
+                <a:solidFill>
+                  <a:schemeClr val="accent2"/>
+                </a:solidFill>
+                <a:latin typeface="Courier New" pitchFamily="49" charset="0"/>
+                <a:cs typeface="Courier New" pitchFamily="49" charset="0"/>
+              </a:rPr>
+              <a:t>bis.b</a:t>
+            </a:r>
+            <a:r>
+              <a:rPr lang="en-US" sz="1200" b="1" dirty="0">
+                <a:solidFill>
+                  <a:schemeClr val="accent2"/>
+                </a:solidFill>
+                <a:latin typeface="Courier New" pitchFamily="49" charset="0"/>
+                <a:cs typeface="Courier New" pitchFamily="49" charset="0"/>
+              </a:rPr>
+              <a:t> #BIT4, &amp;P1SEL                             ; make UCA0CLK available on P1.4</a:t>
+            </a:r>
+          </a:p>
+          <a:p>
+            <a:pPr marL="0" indent="0">
+              <a:buNone/>
+            </a:pPr>
+            <a:r>
+              <a:rPr lang="en-US" sz="1200" b="1" dirty="0">
+                <a:solidFill>
+                  <a:schemeClr val="accent2"/>
+                </a:solidFill>
+                <a:latin typeface="Courier New" pitchFamily="49" charset="0"/>
+                <a:cs typeface="Courier New" pitchFamily="49" charset="0"/>
+              </a:rPr>
+              <a:t>        </a:t>
+            </a:r>
+            <a:r>
+              <a:rPr lang="en-US" sz="1200" b="1" dirty="0" err="1">
+                <a:solidFill>
+                  <a:schemeClr val="accent2"/>
+                </a:solidFill>
+                <a:latin typeface="Courier New" pitchFamily="49" charset="0"/>
+                <a:cs typeface="Courier New" pitchFamily="49" charset="0"/>
+              </a:rPr>
+              <a:t>bis.b</a:t>
+            </a:r>
+            <a:r>
+              <a:rPr lang="en-US" sz="1200" b="1" dirty="0">
+                <a:solidFill>
+                  <a:schemeClr val="accent2"/>
+                </a:solidFill>
+                <a:latin typeface="Courier New" pitchFamily="49" charset="0"/>
+                <a:cs typeface="Courier New" pitchFamily="49" charset="0"/>
+              </a:rPr>
+              <a:t> #BIT4, &amp;P1SEL2</a:t>
+            </a:r>
+          </a:p>
+          <a:p>
+            <a:pPr marL="0" indent="0">
+              <a:buNone/>
+            </a:pPr>
+            <a:r>
+              <a:rPr lang="en-US" sz="1200" b="1" dirty="0" smtClean="0">
+                <a:solidFill>
+                  <a:schemeClr val="accent2"/>
+                </a:solidFill>
+                <a:latin typeface="Courier New" pitchFamily="49" charset="0"/>
+                <a:cs typeface="Courier New" pitchFamily="49" charset="0"/>
+              </a:rPr>
+              <a:t>        </a:t>
+            </a:r>
+            <a:r>
+              <a:rPr lang="en-US" sz="1200" b="1" dirty="0" err="1">
+                <a:solidFill>
+                  <a:schemeClr val="accent2"/>
+                </a:solidFill>
+                <a:latin typeface="Courier New" pitchFamily="49" charset="0"/>
+                <a:cs typeface="Courier New" pitchFamily="49" charset="0"/>
+              </a:rPr>
+              <a:t>bis.b</a:t>
+            </a:r>
+            <a:r>
+              <a:rPr lang="en-US" sz="1200" b="1" dirty="0">
+                <a:solidFill>
+                  <a:schemeClr val="accent2"/>
+                </a:solidFill>
+                <a:latin typeface="Courier New" pitchFamily="49" charset="0"/>
+                <a:cs typeface="Courier New" pitchFamily="49" charset="0"/>
+              </a:rPr>
+              <a:t> #BIT2, &amp;P1SEL                             ; make UCA0SSIMO available on P1.2</a:t>
+            </a:r>
+          </a:p>
+          <a:p>
+            <a:pPr marL="0" indent="0">
+              <a:buNone/>
+            </a:pPr>
+            <a:r>
+              <a:rPr lang="en-US" sz="1200" b="1" dirty="0">
+                <a:solidFill>
+                  <a:schemeClr val="accent2"/>
+                </a:solidFill>
+                <a:latin typeface="Courier New" pitchFamily="49" charset="0"/>
+                <a:cs typeface="Courier New" pitchFamily="49" charset="0"/>
+              </a:rPr>
+              <a:t>        </a:t>
+            </a:r>
+            <a:r>
+              <a:rPr lang="en-US" sz="1200" b="1" dirty="0" err="1">
+                <a:solidFill>
+                  <a:schemeClr val="accent2"/>
+                </a:solidFill>
+                <a:latin typeface="Courier New" pitchFamily="49" charset="0"/>
+                <a:cs typeface="Courier New" pitchFamily="49" charset="0"/>
+              </a:rPr>
+              <a:t>bis.b</a:t>
+            </a:r>
+            <a:r>
+              <a:rPr lang="en-US" sz="1200" b="1" dirty="0">
+                <a:solidFill>
+                  <a:schemeClr val="accent2"/>
+                </a:solidFill>
+                <a:latin typeface="Courier New" pitchFamily="49" charset="0"/>
+                <a:cs typeface="Courier New" pitchFamily="49" charset="0"/>
+              </a:rPr>
+              <a:t> #BIT2, &amp;P1SEL2</a:t>
+            </a:r>
+          </a:p>
+          <a:p>
+            <a:pPr marL="0" indent="0">
+              <a:buNone/>
+            </a:pPr>
+            <a:r>
+              <a:rPr lang="en-US" sz="1200" b="1" dirty="0" smtClean="0">
+                <a:solidFill>
+                  <a:schemeClr val="accent2"/>
+                </a:solidFill>
+                <a:latin typeface="Courier New" pitchFamily="49" charset="0"/>
+                <a:cs typeface="Courier New" pitchFamily="49" charset="0"/>
+              </a:rPr>
+              <a:t>        </a:t>
+            </a:r>
+            <a:r>
+              <a:rPr lang="en-US" sz="1200" b="1" dirty="0" err="1">
+                <a:solidFill>
+                  <a:schemeClr val="accent2"/>
+                </a:solidFill>
+                <a:latin typeface="Courier New" pitchFamily="49" charset="0"/>
+                <a:cs typeface="Courier New" pitchFamily="49" charset="0"/>
+              </a:rPr>
+              <a:t>bis.b</a:t>
+            </a:r>
+            <a:r>
+              <a:rPr lang="en-US" sz="1200" b="1" dirty="0">
+                <a:solidFill>
+                  <a:schemeClr val="accent2"/>
+                </a:solidFill>
+                <a:latin typeface="Courier New" pitchFamily="49" charset="0"/>
+                <a:cs typeface="Courier New" pitchFamily="49" charset="0"/>
+              </a:rPr>
+              <a:t> #BIT1, &amp;P1SEL                             ; make UCA0SSOMI available on P1.1</a:t>
+            </a:r>
+          </a:p>
+          <a:p>
+            <a:pPr marL="0" indent="0">
+              <a:buNone/>
+            </a:pPr>
+            <a:r>
+              <a:rPr lang="en-US" sz="1200" b="1" dirty="0">
+                <a:solidFill>
+                  <a:schemeClr val="accent2"/>
+                </a:solidFill>
+                <a:latin typeface="Courier New" pitchFamily="49" charset="0"/>
+                <a:cs typeface="Courier New" pitchFamily="49" charset="0"/>
+              </a:rPr>
+              <a:t>        </a:t>
+            </a:r>
+            <a:r>
+              <a:rPr lang="en-US" sz="1200" b="1" dirty="0" err="1">
+                <a:solidFill>
+                  <a:schemeClr val="accent2"/>
+                </a:solidFill>
+                <a:latin typeface="Courier New" pitchFamily="49" charset="0"/>
+                <a:cs typeface="Courier New" pitchFamily="49" charset="0"/>
+              </a:rPr>
+              <a:t>bis.b</a:t>
+            </a:r>
+            <a:r>
+              <a:rPr lang="en-US" sz="1200" b="1" dirty="0">
+                <a:solidFill>
+                  <a:schemeClr val="accent2"/>
+                </a:solidFill>
+                <a:latin typeface="Courier New" pitchFamily="49" charset="0"/>
+                <a:cs typeface="Courier New" pitchFamily="49" charset="0"/>
+              </a:rPr>
+              <a:t> #BIT1, &amp;P1SEL2</a:t>
+            </a:r>
+          </a:p>
+          <a:p>
+            <a:pPr marL="0" indent="0">
+              <a:buNone/>
+            </a:pPr>
+            <a:r>
+              <a:rPr lang="en-US" sz="1200" b="1" dirty="0" smtClean="0">
+                <a:solidFill>
+                  <a:schemeClr val="accent2"/>
+                </a:solidFill>
+                <a:latin typeface="Courier New" pitchFamily="49" charset="0"/>
+                <a:cs typeface="Courier New" pitchFamily="49" charset="0"/>
+              </a:rPr>
+              <a:t>        </a:t>
+            </a:r>
+            <a:r>
+              <a:rPr lang="en-US" sz="1200" b="1" dirty="0" err="1">
+                <a:solidFill>
+                  <a:schemeClr val="accent2"/>
+                </a:solidFill>
+                <a:latin typeface="Courier New" pitchFamily="49" charset="0"/>
+                <a:cs typeface="Courier New" pitchFamily="49" charset="0"/>
+              </a:rPr>
+              <a:t>bic.b</a:t>
+            </a:r>
+            <a:r>
+              <a:rPr lang="en-US" sz="1200" b="1" dirty="0">
+                <a:solidFill>
+                  <a:schemeClr val="accent2"/>
+                </a:solidFill>
+                <a:latin typeface="Courier New" pitchFamily="49" charset="0"/>
+                <a:cs typeface="Courier New" pitchFamily="49" charset="0"/>
+              </a:rPr>
+              <a:t> #UCSWRST, &amp;UCA0CTL1                       ; enable </a:t>
+            </a:r>
+            <a:r>
+              <a:rPr lang="en-US" sz="1200" b="1" dirty="0" smtClean="0">
+                <a:solidFill>
+                  <a:schemeClr val="accent2"/>
+                </a:solidFill>
+                <a:latin typeface="Courier New" pitchFamily="49" charset="0"/>
+                <a:cs typeface="Courier New" pitchFamily="49" charset="0"/>
+              </a:rPr>
+              <a:t>subsystem</a:t>
+            </a:r>
+          </a:p>
+          <a:p>
+            <a:pPr marL="0" indent="0">
+              <a:buNone/>
+            </a:pPr>
+            <a:endParaRPr lang="en-US" sz="1200" b="1" dirty="0">
+              <a:solidFill>
+                <a:schemeClr val="accent2"/>
+              </a:solidFill>
+              <a:latin typeface="Courier New" pitchFamily="49" charset="0"/>
+              <a:cs typeface="Courier New" pitchFamily="49" charset="0"/>
+            </a:endParaRPr>
+          </a:p>
+          <a:p>
+            <a:pPr marL="0" indent="0">
+              <a:buNone/>
+            </a:pPr>
+            <a:r>
+              <a:rPr lang="en-US" sz="1200" b="1" dirty="0" smtClean="0">
+                <a:solidFill>
+                  <a:schemeClr val="accent2"/>
+                </a:solidFill>
+                <a:latin typeface="Courier New" pitchFamily="49" charset="0"/>
+                <a:cs typeface="Courier New" pitchFamily="49" charset="0"/>
+              </a:rPr>
+              <a:t>send    </a:t>
+            </a:r>
+            <a:r>
+              <a:rPr lang="en-US" sz="1200" b="1" dirty="0" err="1">
+                <a:solidFill>
+                  <a:schemeClr val="accent2"/>
+                </a:solidFill>
+                <a:latin typeface="Courier New" pitchFamily="49" charset="0"/>
+                <a:cs typeface="Courier New" pitchFamily="49" charset="0"/>
+              </a:rPr>
+              <a:t>mov.b</a:t>
+            </a:r>
+            <a:r>
+              <a:rPr lang="en-US" sz="1200" b="1" dirty="0">
+                <a:solidFill>
+                  <a:schemeClr val="accent2"/>
+                </a:solidFill>
+                <a:latin typeface="Courier New" pitchFamily="49" charset="0"/>
+                <a:cs typeface="Courier New" pitchFamily="49" charset="0"/>
+              </a:rPr>
+              <a:t> #0xBB, &amp;</a:t>
+            </a:r>
+            <a:r>
+              <a:rPr lang="en-US" sz="1200" b="1" dirty="0" smtClean="0">
+                <a:solidFill>
+                  <a:schemeClr val="accent2"/>
+                </a:solidFill>
+                <a:latin typeface="Courier New" pitchFamily="49" charset="0"/>
+                <a:cs typeface="Courier New" pitchFamily="49" charset="0"/>
+              </a:rPr>
+              <a:t>UCA0TXBUF          ; </a:t>
+            </a:r>
+            <a:r>
+              <a:rPr lang="en-US" sz="1200" b="1" dirty="0">
+                <a:solidFill>
+                  <a:schemeClr val="accent2"/>
+                </a:solidFill>
+                <a:latin typeface="Courier New" pitchFamily="49" charset="0"/>
+                <a:cs typeface="Courier New" pitchFamily="49" charset="0"/>
+              </a:rPr>
+              <a:t>place a byte in the TX buffer</a:t>
+            </a:r>
+          </a:p>
+          <a:p>
+            <a:pPr marL="0" indent="0">
+              <a:buNone/>
+            </a:pPr>
+            <a:r>
+              <a:rPr lang="en-US" sz="1200" b="1" dirty="0" smtClean="0">
+                <a:solidFill>
+                  <a:schemeClr val="accent2"/>
+                </a:solidFill>
+                <a:latin typeface="Courier New" pitchFamily="49" charset="0"/>
+                <a:cs typeface="Courier New" pitchFamily="49" charset="0"/>
+              </a:rPr>
+              <a:t>wait    </a:t>
+            </a:r>
+            <a:r>
+              <a:rPr lang="en-US" sz="1200" b="1" dirty="0" err="1">
+                <a:solidFill>
+                  <a:schemeClr val="accent2"/>
+                </a:solidFill>
+                <a:latin typeface="Courier New" pitchFamily="49" charset="0"/>
+                <a:cs typeface="Courier New" pitchFamily="49" charset="0"/>
+              </a:rPr>
+              <a:t>bit.b</a:t>
+            </a:r>
+            <a:r>
+              <a:rPr lang="en-US" sz="1200" b="1" dirty="0">
+                <a:solidFill>
+                  <a:schemeClr val="accent2"/>
+                </a:solidFill>
+                <a:latin typeface="Courier New" pitchFamily="49" charset="0"/>
+                <a:cs typeface="Courier New" pitchFamily="49" charset="0"/>
+              </a:rPr>
+              <a:t> </a:t>
+            </a:r>
+            <a:r>
+              <a:rPr lang="en-US" sz="1200" b="1" dirty="0" smtClean="0">
+                <a:solidFill>
+                  <a:schemeClr val="accent2"/>
+                </a:solidFill>
+                <a:latin typeface="Courier New" pitchFamily="49" charset="0"/>
+                <a:cs typeface="Courier New" pitchFamily="49" charset="0"/>
+              </a:rPr>
+              <a:t>#</a:t>
+            </a:r>
+            <a:r>
+              <a:rPr lang="en-US" sz="1200" b="1" dirty="0">
+                <a:solidFill>
+                  <a:schemeClr val="accent2"/>
+                </a:solidFill>
+                <a:latin typeface="Courier New" pitchFamily="49" charset="0"/>
+                <a:cs typeface="Courier New" pitchFamily="49" charset="0"/>
+              </a:rPr>
+              <a:t>UCA0RXIFG, &amp;</a:t>
+            </a:r>
+            <a:r>
+              <a:rPr lang="en-US" sz="1200" b="1" dirty="0" smtClean="0">
+                <a:solidFill>
+                  <a:schemeClr val="accent2"/>
+                </a:solidFill>
+                <a:latin typeface="Courier New" pitchFamily="49" charset="0"/>
+                <a:cs typeface="Courier New" pitchFamily="49" charset="0"/>
+              </a:rPr>
+              <a:t>IFG2          </a:t>
+            </a:r>
+            <a:r>
+              <a:rPr lang="en-US" sz="1000" b="1" dirty="0" smtClean="0">
+                <a:solidFill>
+                  <a:schemeClr val="accent2"/>
+                </a:solidFill>
+                <a:latin typeface="Courier New" pitchFamily="49" charset="0"/>
+                <a:cs typeface="Courier New" pitchFamily="49" charset="0"/>
+              </a:rPr>
+              <a:t>; </a:t>
+            </a:r>
+            <a:r>
+              <a:rPr lang="en-US" sz="1000" b="1" dirty="0">
+                <a:solidFill>
+                  <a:schemeClr val="accent2"/>
+                </a:solidFill>
+                <a:latin typeface="Courier New" pitchFamily="49" charset="0"/>
+                <a:cs typeface="Courier New" pitchFamily="49" charset="0"/>
+              </a:rPr>
+              <a:t>wait for receive flag to be set (operation complete)</a:t>
+            </a:r>
+          </a:p>
+          <a:p>
+            <a:pPr marL="0" indent="0">
+              <a:buNone/>
+            </a:pPr>
+            <a:r>
+              <a:rPr lang="en-US" sz="1200" b="1" dirty="0">
+                <a:solidFill>
+                  <a:schemeClr val="accent2"/>
+                </a:solidFill>
+                <a:latin typeface="Courier New" pitchFamily="49" charset="0"/>
+                <a:cs typeface="Courier New" pitchFamily="49" charset="0"/>
+              </a:rPr>
+              <a:t>        </a:t>
+            </a:r>
+            <a:r>
+              <a:rPr lang="en-US" sz="1200" b="1" dirty="0" err="1">
+                <a:solidFill>
+                  <a:schemeClr val="accent2"/>
+                </a:solidFill>
+                <a:latin typeface="Courier New" pitchFamily="49" charset="0"/>
+                <a:cs typeface="Courier New" pitchFamily="49" charset="0"/>
+              </a:rPr>
+              <a:t>jz</a:t>
+            </a:r>
+            <a:r>
+              <a:rPr lang="en-US" sz="1200" b="1" dirty="0">
+                <a:solidFill>
+                  <a:schemeClr val="accent2"/>
+                </a:solidFill>
+                <a:latin typeface="Courier New" pitchFamily="49" charset="0"/>
+                <a:cs typeface="Courier New" pitchFamily="49" charset="0"/>
+              </a:rPr>
+              <a:t>    </a:t>
+            </a:r>
+            <a:r>
+              <a:rPr lang="en-US" sz="1200" b="1" dirty="0" smtClean="0">
+                <a:solidFill>
+                  <a:schemeClr val="accent2"/>
+                </a:solidFill>
+                <a:latin typeface="Courier New" pitchFamily="49" charset="0"/>
+                <a:cs typeface="Courier New" pitchFamily="49" charset="0"/>
+              </a:rPr>
+              <a:t>wait</a:t>
+            </a:r>
+            <a:endParaRPr lang="en-US" sz="1200" b="1" dirty="0">
+              <a:solidFill>
+                <a:schemeClr val="accent2"/>
+              </a:solidFill>
+              <a:latin typeface="Courier New" pitchFamily="49" charset="0"/>
+              <a:cs typeface="Courier New" pitchFamily="49" charset="0"/>
+            </a:endParaRPr>
+          </a:p>
+          <a:p>
+            <a:pPr marL="0" indent="0">
+              <a:buNone/>
+            </a:pPr>
+            <a:r>
+              <a:rPr lang="en-US" sz="1200" b="1" dirty="0" smtClean="0">
+                <a:solidFill>
+                  <a:schemeClr val="accent2"/>
+                </a:solidFill>
+                <a:latin typeface="Courier New" pitchFamily="49" charset="0"/>
+                <a:cs typeface="Courier New" pitchFamily="49" charset="0"/>
+              </a:rPr>
+              <a:t>        </a:t>
+            </a:r>
+            <a:r>
+              <a:rPr lang="en-US" sz="1200" b="1" dirty="0" err="1">
+                <a:solidFill>
+                  <a:schemeClr val="accent2"/>
+                </a:solidFill>
+                <a:latin typeface="Courier New" pitchFamily="49" charset="0"/>
+                <a:cs typeface="Courier New" pitchFamily="49" charset="0"/>
+              </a:rPr>
+              <a:t>mov.b</a:t>
+            </a:r>
+            <a:r>
+              <a:rPr lang="en-US" sz="1200" b="1" dirty="0">
+                <a:solidFill>
+                  <a:schemeClr val="accent2"/>
+                </a:solidFill>
+                <a:latin typeface="Courier New" pitchFamily="49" charset="0"/>
+                <a:cs typeface="Courier New" pitchFamily="49" charset="0"/>
+              </a:rPr>
+              <a:t> </a:t>
+            </a:r>
+            <a:r>
+              <a:rPr lang="en-US" sz="1200" b="1" dirty="0" smtClean="0">
+                <a:solidFill>
+                  <a:schemeClr val="accent2"/>
+                </a:solidFill>
+                <a:latin typeface="Courier New" pitchFamily="49" charset="0"/>
+                <a:cs typeface="Courier New" pitchFamily="49" charset="0"/>
+              </a:rPr>
+              <a:t>&amp;</a:t>
+            </a:r>
+            <a:r>
+              <a:rPr lang="en-US" sz="1200" b="1" dirty="0">
+                <a:solidFill>
+                  <a:schemeClr val="accent2"/>
+                </a:solidFill>
+                <a:latin typeface="Courier New" pitchFamily="49" charset="0"/>
+                <a:cs typeface="Courier New" pitchFamily="49" charset="0"/>
+              </a:rPr>
+              <a:t>UCA0RXBUF, </a:t>
+            </a:r>
+            <a:r>
+              <a:rPr lang="en-US" sz="1200" b="1" dirty="0" smtClean="0">
+                <a:solidFill>
+                  <a:schemeClr val="accent2"/>
+                </a:solidFill>
+                <a:latin typeface="Courier New" pitchFamily="49" charset="0"/>
+                <a:cs typeface="Courier New" pitchFamily="49" charset="0"/>
+              </a:rPr>
+              <a:t>r4             ; </a:t>
+            </a:r>
+            <a:r>
+              <a:rPr lang="en-US" sz="1200" b="1" dirty="0">
+                <a:solidFill>
+                  <a:schemeClr val="accent2"/>
+                </a:solidFill>
+                <a:latin typeface="Courier New" pitchFamily="49" charset="0"/>
+                <a:cs typeface="Courier New" pitchFamily="49" charset="0"/>
+              </a:rPr>
+              <a:t>read RX buffer to clear flag</a:t>
+            </a:r>
+          </a:p>
+          <a:p>
+            <a:pPr marL="0" indent="0">
+              <a:buNone/>
+            </a:pPr>
+            <a:r>
+              <a:rPr lang="en-US" sz="1200" b="1" dirty="0">
+                <a:solidFill>
+                  <a:schemeClr val="accent2"/>
+                </a:solidFill>
+                <a:latin typeface="Courier New" pitchFamily="49" charset="0"/>
+                <a:cs typeface="Courier New" pitchFamily="49" charset="0"/>
+              </a:rPr>
+              <a:t>        </a:t>
+            </a:r>
+            <a:r>
+              <a:rPr lang="en-US" sz="1200" b="1" dirty="0" err="1">
+                <a:solidFill>
+                  <a:schemeClr val="accent2"/>
+                </a:solidFill>
+                <a:latin typeface="Courier New" pitchFamily="49" charset="0"/>
+                <a:cs typeface="Courier New" pitchFamily="49" charset="0"/>
+              </a:rPr>
+              <a:t>jmp</a:t>
+            </a:r>
+            <a:r>
+              <a:rPr lang="en-US" sz="1200" b="1" dirty="0">
+                <a:solidFill>
+                  <a:schemeClr val="accent2"/>
+                </a:solidFill>
+                <a:latin typeface="Courier New" pitchFamily="49" charset="0"/>
+                <a:cs typeface="Courier New" pitchFamily="49" charset="0"/>
+              </a:rPr>
+              <a:t>    </a:t>
+            </a:r>
+            <a:r>
+              <a:rPr lang="en-US" sz="1200" b="1" dirty="0" smtClean="0">
+                <a:solidFill>
+                  <a:schemeClr val="accent2"/>
+                </a:solidFill>
+                <a:latin typeface="Courier New" pitchFamily="49" charset="0"/>
+                <a:cs typeface="Courier New" pitchFamily="49" charset="0"/>
+              </a:rPr>
+              <a:t>send                      ; </a:t>
+            </a:r>
+            <a:r>
+              <a:rPr lang="en-US" sz="1200" b="1" dirty="0">
+                <a:solidFill>
+                  <a:schemeClr val="accent2"/>
+                </a:solidFill>
+                <a:latin typeface="Courier New" pitchFamily="49" charset="0"/>
+                <a:cs typeface="Courier New" pitchFamily="49" charset="0"/>
+              </a:rPr>
+              <a:t>send another byte</a:t>
+            </a:r>
           </a:p>
         </p:txBody>
       </p:sp>
-      <p:pic>
-        <p:nvPicPr>
-          <p:cNvPr id="7170" name="Picture 2"/>
-          <p:cNvPicPr>
-            <a:picLocks noChangeAspect="1" noChangeArrowheads="1"/>
-          </p:cNvPicPr>
-          <p:nvPr/>
-        </p:nvPicPr>
-        <p:blipFill>
-          <a:blip r:embed="rId2">
-            <a:extLst>
-              <a:ext uri="{28A0092B-C50C-407E-A947-70E740481C1C}">
-                <a14:useLocalDpi xmlns:a14="http://schemas.microsoft.com/office/drawing/2010/main" val="0"/>
-              </a:ext>
-            </a:extLst>
-          </a:blip>
-          <a:srcRect/>
-          <a:stretch>
-            <a:fillRect/>
-          </a:stretch>
-        </p:blipFill>
-        <p:spPr bwMode="auto">
-          <a:xfrm>
-            <a:off x="849664" y="1219874"/>
-            <a:ext cx="7517501" cy="5638126"/>
-          </a:xfrm>
-          <a:prstGeom prst="rect">
-            <a:avLst/>
-          </a:prstGeom>
-          <a:noFill/>
-          <a:ln>
-            <a:noFill/>
-          </a:ln>
-          <a:extLst>
-            <a:ext uri="{909E8E84-426E-40DD-AFC4-6F175D3DCCD1}">
-              <a14:hiddenFill xmlns:a14="http://schemas.microsoft.com/office/drawing/2010/main">
-                <a:solidFill>
-                  <a:schemeClr val="accent1"/>
-                </a:solidFill>
-              </a14:hiddenFill>
-            </a:ext>
-            <a:ext uri="{91240B29-F687-4F45-9708-019B960494DF}">
-              <a14:hiddenLine xmlns:a14="http://schemas.microsoft.com/office/drawing/2010/main" w="9525">
-                <a:solidFill>
-                  <a:schemeClr val="tx1"/>
-                </a:solidFill>
-                <a:miter lim="800000"/>
-                <a:headEnd/>
-                <a:tailEnd/>
-              </a14:hiddenLine>
-            </a:ext>
-          </a:extLst>
-        </p:spPr>
-      </p:pic>
     </p:spTree>
     <p:extLst>
       <p:ext uri="{BB962C8B-B14F-4D97-AF65-F5344CB8AC3E}">
-        <p14:creationId xmlns:p14="http://schemas.microsoft.com/office/powerpoint/2010/main" val="4175376551"/>
+        <p14:creationId xmlns:p14="http://schemas.microsoft.com/office/powerpoint/2010/main" val="1020724423"/>
       </p:ext>
     </p:extLst>
   </p:cSld>
@@ -5867,8 +6191,8 @@
           <a:lstStyle/>
           <a:p>
             <a:r>
-              <a:rPr lang="en-US" dirty="0" smtClean="0"/>
-              <a:t>Logic Analyzer Demo</a:t>
+              <a:rPr lang="en-US" b="1" dirty="0" smtClean="0"/>
+              <a:t>Logic Analyzer</a:t>
             </a:r>
             <a:endParaRPr lang="en-US" dirty="0"/>
           </a:p>
@@ -5886,7 +6210,7 @@
         </p:nvSpPr>
         <p:spPr>
           <a:xfrm>
-            <a:off x="403269" y="605116"/>
+            <a:off x="395177" y="669852"/>
             <a:ext cx="8493642" cy="4724400"/>
           </a:xfrm>
         </p:spPr>
@@ -5895,124 +6219,37 @@
           <a:lstStyle/>
           <a:p>
             <a:r>
-              <a:rPr lang="en-US" sz="2000" dirty="0">
-                <a:hlinkClick r:id="rId2"/>
-              </a:rPr>
-              <a:t>Logic Analyzer </a:t>
-            </a:r>
-            <a:r>
-              <a:rPr lang="en-US" sz="2000" dirty="0" smtClean="0">
-                <a:hlinkClick r:id="rId2"/>
-              </a:rPr>
-              <a:t>is tutorial </a:t>
-            </a:r>
-            <a:r>
-              <a:rPr lang="en-US" sz="2000" dirty="0">
-                <a:hlinkClick r:id="rId2"/>
-              </a:rPr>
-              <a:t>available here</a:t>
-            </a:r>
-            <a:r>
-              <a:rPr lang="en-US" sz="2000" dirty="0"/>
-              <a:t>.</a:t>
-            </a:r>
-            <a:endParaRPr lang="en-US" sz="2000" dirty="0" smtClean="0">
-              <a:solidFill>
-                <a:schemeClr val="accent2"/>
-              </a:solidFill>
-            </a:endParaRPr>
-          </a:p>
-          <a:p>
-            <a:r>
-              <a:rPr lang="en-US" sz="2000" dirty="0" smtClean="0">
-                <a:solidFill>
-                  <a:schemeClr val="accent2"/>
-                </a:solidFill>
-              </a:rPr>
-              <a:t>Let’s Measure SMCLK    (P1.4)</a:t>
-            </a:r>
-            <a:endParaRPr lang="en-US" sz="2000" dirty="0">
-              <a:solidFill>
-                <a:schemeClr val="accent2"/>
-              </a:solidFill>
-            </a:endParaRPr>
-          </a:p>
-          <a:p>
-            <a:endParaRPr lang="en-US" sz="2000" dirty="0" smtClean="0">
-              <a:solidFill>
-                <a:schemeClr val="accent2"/>
-              </a:solidFill>
-            </a:endParaRPr>
-          </a:p>
-          <a:p>
-            <a:endParaRPr lang="en-US" sz="2000" dirty="0">
-              <a:solidFill>
-                <a:schemeClr val="accent2"/>
-              </a:solidFill>
-            </a:endParaRPr>
-          </a:p>
-          <a:p>
-            <a:endParaRPr lang="en-US" sz="2000" dirty="0" smtClean="0">
-              <a:solidFill>
-                <a:schemeClr val="accent2"/>
-              </a:solidFill>
-            </a:endParaRPr>
-          </a:p>
-          <a:p>
-            <a:endParaRPr lang="en-US" sz="2000" dirty="0">
-              <a:solidFill>
-                <a:schemeClr val="accent2"/>
-              </a:solidFill>
-            </a:endParaRPr>
-          </a:p>
-          <a:p>
-            <a:endParaRPr lang="en-US" sz="2000" dirty="0" smtClean="0">
-              <a:solidFill>
-                <a:schemeClr val="accent2"/>
-              </a:solidFill>
-            </a:endParaRPr>
-          </a:p>
-          <a:p>
-            <a:endParaRPr lang="en-US" sz="2000" dirty="0" smtClean="0">
-              <a:solidFill>
-                <a:schemeClr val="accent2"/>
-              </a:solidFill>
-            </a:endParaRPr>
-          </a:p>
-          <a:p>
-            <a:endParaRPr lang="en-US" sz="2000" dirty="0">
-              <a:solidFill>
-                <a:schemeClr val="accent2"/>
-              </a:solidFill>
-            </a:endParaRPr>
-          </a:p>
-          <a:p>
-            <a:r>
-              <a:rPr lang="en-US" sz="2000" dirty="0" smtClean="0">
-                <a:solidFill>
-                  <a:schemeClr val="accent2"/>
-                </a:solidFill>
-              </a:rPr>
-              <a:t>Multiplexed?  P1SEL1 &amp; P1SEL2?</a:t>
-            </a:r>
-            <a:endParaRPr lang="en-US" sz="1600" dirty="0" smtClean="0"/>
+              <a:rPr lang="en-US" sz="1600" dirty="0" smtClean="0"/>
+              <a:t>Sending 0xBB once  (0x1011 1011)      </a:t>
+            </a:r>
+            <a:r>
+              <a:rPr lang="en-US" sz="1600" dirty="0" smtClean="0">
+                <a:solidFill>
+                  <a:schemeClr val="accent2"/>
+                </a:solidFill>
+              </a:rPr>
+              <a:t>[MSB first!]</a:t>
+            </a:r>
           </a:p>
           <a:p>
             <a:pPr lvl="1"/>
-            <a:endParaRPr lang="en-US" sz="1600" dirty="0" smtClean="0"/>
+            <a:r>
+              <a:rPr lang="en-US" sz="1200" dirty="0"/>
+              <a:t>Note how the clock default state is high and data is read on the second clock edge - consistent with our settings.</a:t>
+            </a:r>
           </a:p>
         </p:txBody>
       </p:sp>
       <p:pic>
         <p:nvPicPr>
-          <p:cNvPr id="4" name="Picture 2" descr="MSP430G2553 Pinout"/>
+          <p:cNvPr id="7170" name="Picture 2"/>
           <p:cNvPicPr>
             <a:picLocks noChangeAspect="1" noChangeArrowheads="1"/>
           </p:cNvPicPr>
           <p:nvPr/>
         </p:nvPicPr>
         <p:blipFill>
-          <a:blip r:embed="rId3">
+          <a:blip r:embed="rId2">
             <a:extLst>
               <a:ext uri="{28A0092B-C50C-407E-A947-70E740481C1C}">
                 <a14:useLocalDpi xmlns:a14="http://schemas.microsoft.com/office/drawing/2010/main" val="0"/>
@@ -6026,49 +6263,8 @@
         </p:blipFill>
         <p:spPr bwMode="auto">
           <a:xfrm>
-            <a:off x="1685925" y="1439615"/>
-            <a:ext cx="6543675" cy="2381250"/>
-          </a:xfrm>
-          <a:prstGeom prst="rect">
-            <a:avLst/>
-          </a:prstGeom>
-          <a:noFill/>
-          <a:extLst>
-            <a:ext uri="{909E8E84-426E-40DD-AFC4-6F175D3DCCD1}">
-              <a14:hiddenFill xmlns:a14="http://schemas.microsoft.com/office/drawing/2010/main">
-                <a:solidFill>
-                  <a:srgbClr val="FFFFFF"/>
-                </a:solidFill>
-              </a14:hiddenFill>
-            </a:ext>
-          </a:extLst>
-        </p:spPr>
-      </p:pic>
-      <p:pic>
-        <p:nvPicPr>
-          <p:cNvPr id="8194" name="Picture 2"/>
-          <p:cNvPicPr>
-            <a:picLocks noChangeAspect="1" noChangeArrowheads="1"/>
-          </p:cNvPicPr>
-          <p:nvPr/>
-        </p:nvPicPr>
-        <p:blipFill>
-          <a:blip r:embed="rId4">
-            <a:extLst>
-              <a:ext uri="{28A0092B-C50C-407E-A947-70E740481C1C}">
-                <a14:useLocalDpi xmlns:a14="http://schemas.microsoft.com/office/drawing/2010/main" val="0"/>
-              </a:ext>
-            </a:extLst>
-          </a:blip>
-          <a:srcRect/>
-          <a:stretch>
-            <a:fillRect/>
-          </a:stretch>
-        </p:blipFill>
-        <p:spPr bwMode="auto">
-          <a:xfrm>
-            <a:off x="2400300" y="4233652"/>
-            <a:ext cx="6743700" cy="3028950"/>
+            <a:off x="849664" y="1219874"/>
+            <a:ext cx="7517501" cy="5638126"/>
           </a:xfrm>
           <a:prstGeom prst="rect">
             <a:avLst/>
@@ -6101,7 +6297,7 @@
     </p:spTree>
     <p:extLst>
       <p:ext uri="{BB962C8B-B14F-4D97-AF65-F5344CB8AC3E}">
-        <p14:creationId xmlns:p14="http://schemas.microsoft.com/office/powerpoint/2010/main" val="2327061822"/>
+        <p14:creationId xmlns:p14="http://schemas.microsoft.com/office/powerpoint/2010/main" val="4175376551"/>
       </p:ext>
     </p:extLst>
   </p:cSld>
@@ -6151,8 +6347,8 @@
           <a:lstStyle/>
           <a:p>
             <a:r>
-              <a:rPr lang="en-US" b="1" dirty="0" smtClean="0"/>
-              <a:t>Measure SMCLK</a:t>
+              <a:rPr lang="en-US" dirty="0" smtClean="0"/>
+              <a:t>Logic Analyzer Demo</a:t>
             </a:r>
             <a:endParaRPr lang="en-US" dirty="0"/>
           </a:p>
@@ -6170,7 +6366,7 @@
         </p:nvSpPr>
         <p:spPr>
           <a:xfrm>
-            <a:off x="395177" y="669852"/>
+            <a:off x="403269" y="605116"/>
             <a:ext cx="8493642" cy="4724400"/>
           </a:xfrm>
         </p:spPr>
@@ -6179,118 +6375,124 @@
           <a:lstStyle/>
           <a:p>
             <a:r>
-              <a:rPr lang="en-US" sz="1600" dirty="0" smtClean="0"/>
-              <a:t>Hook </a:t>
-            </a:r>
-            <a:r>
-              <a:rPr lang="en-US" sz="1600" dirty="0"/>
-              <a:t>up the black Ground wire on Pod 1 to ground on the </a:t>
-            </a:r>
-            <a:r>
-              <a:rPr lang="en-US" sz="1600" dirty="0" smtClean="0"/>
-              <a:t>MSP430</a:t>
-            </a:r>
-          </a:p>
-          <a:p>
-            <a:r>
-              <a:rPr lang="en-US" sz="1600" dirty="0" smtClean="0"/>
-              <a:t>Hook </a:t>
-            </a:r>
-            <a:r>
-              <a:rPr lang="en-US" sz="1600" dirty="0"/>
-              <a:t>up Pod 1 </a:t>
-            </a:r>
-            <a:r>
-              <a:rPr lang="en-US" sz="1600" dirty="0" smtClean="0"/>
-              <a:t>Wire </a:t>
-            </a:r>
-            <a:r>
-              <a:rPr lang="en-US" sz="1600" dirty="0"/>
-              <a:t>0 to </a:t>
-            </a:r>
-            <a:r>
-              <a:rPr lang="en-US" sz="1600" dirty="0" smtClean="0"/>
-              <a:t>P1.4 (SMCLK)</a:t>
-            </a:r>
-          </a:p>
-          <a:p>
-            <a:r>
-              <a:rPr lang="en-US" sz="1600" dirty="0" smtClean="0"/>
-              <a:t>Sampling </a:t>
-            </a:r>
-            <a:r>
-              <a:rPr lang="en-US" sz="1600" dirty="0"/>
-              <a:t>setup </a:t>
-            </a:r>
-            <a:r>
-              <a:rPr lang="en-US" sz="1600" dirty="0" smtClean="0"/>
-              <a:t>screen: set </a:t>
-            </a:r>
-            <a:r>
-              <a:rPr lang="en-US" sz="1600" dirty="0"/>
-              <a:t>the sampling speed to be the fastest possible (once every 2ns</a:t>
-            </a:r>
-            <a:r>
-              <a:rPr lang="en-US" sz="1600" dirty="0" smtClean="0"/>
-              <a:t>)</a:t>
-            </a:r>
-          </a:p>
-          <a:p>
-            <a:r>
-              <a:rPr lang="en-US" sz="1600" dirty="0"/>
-              <a:t>Waveform screen and set the trigger on my </a:t>
-            </a:r>
-            <a:r>
-              <a:rPr lang="en-US" sz="1600" dirty="0" smtClean="0"/>
-              <a:t>signal </a:t>
-            </a:r>
-            <a:r>
-              <a:rPr lang="en-US" sz="1600" dirty="0"/>
-              <a:t>to be falling </a:t>
-            </a:r>
-            <a:r>
-              <a:rPr lang="en-US" sz="1600" dirty="0" smtClean="0"/>
-              <a:t>edge</a:t>
-            </a:r>
-          </a:p>
-          <a:p>
-            <a:r>
-              <a:rPr lang="en-US" sz="1600" dirty="0"/>
-              <a:t>Run Single button </a:t>
+              <a:rPr lang="en-US" sz="2000" dirty="0">
+                <a:hlinkClick r:id="rId2"/>
+              </a:rPr>
+              <a:t>Logic Analyzer </a:t>
+            </a:r>
+            <a:r>
+              <a:rPr lang="en-US" sz="2000" dirty="0" smtClean="0">
+                <a:hlinkClick r:id="rId2"/>
+              </a:rPr>
+              <a:t>is tutorial </a:t>
+            </a:r>
+            <a:r>
+              <a:rPr lang="en-US" sz="2000" dirty="0">
+                <a:hlinkClick r:id="rId2"/>
+              </a:rPr>
+              <a:t>available here</a:t>
+            </a:r>
+            <a:r>
+              <a:rPr lang="en-US" sz="2000" dirty="0"/>
+              <a:t>.</a:t>
+            </a:r>
+            <a:endParaRPr lang="en-US" sz="2000" dirty="0" smtClean="0">
+              <a:solidFill>
+                <a:schemeClr val="accent2"/>
+              </a:solidFill>
+            </a:endParaRPr>
+          </a:p>
+          <a:p>
+            <a:r>
+              <a:rPr lang="en-US" sz="2000" dirty="0" smtClean="0">
+                <a:solidFill>
+                  <a:schemeClr val="accent2"/>
+                </a:solidFill>
+              </a:rPr>
+              <a:t>Let’s Measure SMCLK    (P1.4)</a:t>
+            </a:r>
+            <a:endParaRPr lang="en-US" sz="2000" dirty="0">
+              <a:solidFill>
+                <a:schemeClr val="accent2"/>
+              </a:solidFill>
+            </a:endParaRPr>
+          </a:p>
+          <a:p>
+            <a:endParaRPr lang="en-US" sz="2000" dirty="0" smtClean="0">
+              <a:solidFill>
+                <a:schemeClr val="accent2"/>
+              </a:solidFill>
+            </a:endParaRPr>
+          </a:p>
+          <a:p>
+            <a:endParaRPr lang="en-US" sz="2000" dirty="0">
+              <a:solidFill>
+                <a:schemeClr val="accent2"/>
+              </a:solidFill>
+            </a:endParaRPr>
+          </a:p>
+          <a:p>
+            <a:endParaRPr lang="en-US" sz="2000" dirty="0" smtClean="0">
+              <a:solidFill>
+                <a:schemeClr val="accent2"/>
+              </a:solidFill>
+            </a:endParaRPr>
+          </a:p>
+          <a:p>
+            <a:endParaRPr lang="en-US" sz="2000" dirty="0">
+              <a:solidFill>
+                <a:schemeClr val="accent2"/>
+              </a:solidFill>
+            </a:endParaRPr>
+          </a:p>
+          <a:p>
+            <a:endParaRPr lang="en-US" sz="2000" dirty="0" smtClean="0">
+              <a:solidFill>
+                <a:schemeClr val="accent2"/>
+              </a:solidFill>
+            </a:endParaRPr>
+          </a:p>
+          <a:p>
+            <a:endParaRPr lang="en-US" sz="2000" dirty="0" smtClean="0">
+              <a:solidFill>
+                <a:schemeClr val="accent2"/>
+              </a:solidFill>
+            </a:endParaRPr>
+          </a:p>
+          <a:p>
+            <a:endParaRPr lang="en-US" sz="2000" dirty="0">
+              <a:solidFill>
+                <a:schemeClr val="accent2"/>
+              </a:solidFill>
+            </a:endParaRPr>
+          </a:p>
+          <a:p>
+            <a:r>
+              <a:rPr lang="en-US" sz="2000" dirty="0" smtClean="0">
+                <a:solidFill>
+                  <a:schemeClr val="accent2"/>
+                </a:solidFill>
+              </a:rPr>
+              <a:t>Multiplexed?  P1SEL1 &amp; P1SEL2?</a:t>
             </a:r>
             <a:endParaRPr lang="en-US" sz="1600" dirty="0" smtClean="0"/>
           </a:p>
           <a:p>
-            <a:r>
-              <a:rPr lang="en-US" sz="1600" dirty="0"/>
-              <a:t>D</a:t>
-            </a:r>
-            <a:r>
-              <a:rPr lang="en-US" sz="1600" dirty="0" smtClean="0"/>
-              <a:t>rag </a:t>
-            </a:r>
-            <a:r>
-              <a:rPr lang="en-US" sz="1600" dirty="0"/>
-              <a:t>markers to measure falling edge to falling edge </a:t>
-            </a:r>
-            <a:r>
-              <a:rPr lang="en-US" sz="1600" dirty="0" smtClean="0"/>
-              <a:t>of SMCLK</a:t>
-            </a:r>
-            <a:endParaRPr lang="en-US" sz="1600" dirty="0"/>
+            <a:pPr lvl="1"/>
+            <a:endParaRPr lang="en-US" sz="1600" dirty="0" smtClean="0"/>
           </a:p>
         </p:txBody>
       </p:sp>
       <p:pic>
         <p:nvPicPr>
-          <p:cNvPr id="4099" name="Picture 3"/>
+          <p:cNvPr id="4" name="Picture 2" descr="MSP430G2553 Pinout"/>
           <p:cNvPicPr>
             <a:picLocks noChangeAspect="1" noChangeArrowheads="1"/>
           </p:cNvPicPr>
           <p:nvPr/>
         </p:nvPicPr>
         <p:blipFill>
-          <a:blip r:embed="rId2">
+          <a:blip r:embed="rId3">
             <a:extLst>
               <a:ext uri="{28A0092B-C50C-407E-A947-70E740481C1C}">
                 <a14:useLocalDpi xmlns:a14="http://schemas.microsoft.com/office/drawing/2010/main" val="0"/>
@@ -6304,8 +6506,49 @@
         </p:blipFill>
         <p:spPr bwMode="auto">
           <a:xfrm>
-            <a:off x="552956" y="2403027"/>
-            <a:ext cx="8232297" cy="6174223"/>
+            <a:off x="1685925" y="1439615"/>
+            <a:ext cx="6543675" cy="2381250"/>
+          </a:xfrm>
+          <a:prstGeom prst="rect">
+            <a:avLst/>
+          </a:prstGeom>
+          <a:noFill/>
+          <a:extLst>
+            <a:ext uri="{909E8E84-426E-40DD-AFC4-6F175D3DCCD1}">
+              <a14:hiddenFill xmlns:a14="http://schemas.microsoft.com/office/drawing/2010/main">
+                <a:solidFill>
+                  <a:srgbClr val="FFFFFF"/>
+                </a:solidFill>
+              </a14:hiddenFill>
+            </a:ext>
+          </a:extLst>
+        </p:spPr>
+      </p:pic>
+      <p:pic>
+        <p:nvPicPr>
+          <p:cNvPr id="8194" name="Picture 2"/>
+          <p:cNvPicPr>
+            <a:picLocks noChangeAspect="1" noChangeArrowheads="1"/>
+          </p:cNvPicPr>
+          <p:nvPr/>
+        </p:nvPicPr>
+        <p:blipFill>
+          <a:blip r:embed="rId4">
+            <a:extLst>
+              <a:ext uri="{28A0092B-C50C-407E-A947-70E740481C1C}">
+                <a14:useLocalDpi xmlns:a14="http://schemas.microsoft.com/office/drawing/2010/main" val="0"/>
+              </a:ext>
+            </a:extLst>
+          </a:blip>
+          <a:srcRect/>
+          <a:stretch>
+            <a:fillRect/>
+          </a:stretch>
+        </p:blipFill>
+        <p:spPr bwMode="auto">
+          <a:xfrm>
+            <a:off x="2400300" y="4233652"/>
+            <a:ext cx="6743700" cy="3028950"/>
           </a:xfrm>
           <a:prstGeom prst="rect">
             <a:avLst/>
@@ -6335,182 +6578,10 @@
           </a:extLst>
         </p:spPr>
       </p:pic>
-      <p:sp>
-        <p:nvSpPr>
-          <p:cNvPr id="4" name="TextBox 3"/>
-          <p:cNvSpPr txBox="1"/>
-          <p:nvPr/>
-        </p:nvSpPr>
-        <p:spPr>
-          <a:xfrm>
-            <a:off x="2581360" y="4766864"/>
-            <a:ext cx="4709564" cy="1446550"/>
-          </a:xfrm>
-          <a:prstGeom prst="rect">
-            <a:avLst/>
-          </a:prstGeom>
-          <a:noFill/>
-        </p:spPr>
-        <p:txBody>
-          <a:bodyPr wrap="square" rtlCol="0">
-            <a:spAutoFit/>
-          </a:bodyPr>
-          <a:lstStyle/>
-          <a:p>
-            <a:r>
-              <a:rPr lang="en-US" sz="1600" b="1" dirty="0" smtClean="0">
-                <a:solidFill>
-                  <a:schemeClr val="bg1"/>
-                </a:solidFill>
-                <a:latin typeface="Courier New" pitchFamily="49" charset="0"/>
-                <a:cs typeface="Courier New" pitchFamily="49" charset="0"/>
-              </a:rPr>
-              <a:t>        </a:t>
-            </a:r>
-            <a:r>
-              <a:rPr lang="en-US" sz="1600" b="1" dirty="0" err="1" smtClean="0">
-                <a:solidFill>
-                  <a:schemeClr val="bg1"/>
-                </a:solidFill>
-                <a:latin typeface="Courier New" pitchFamily="49" charset="0"/>
-                <a:cs typeface="Courier New" pitchFamily="49" charset="0"/>
-              </a:rPr>
-              <a:t>bis.b</a:t>
-            </a:r>
-            <a:r>
-              <a:rPr lang="en-US" sz="1600" b="1" dirty="0" smtClean="0">
-                <a:solidFill>
-                  <a:schemeClr val="bg1"/>
-                </a:solidFill>
-                <a:latin typeface="Courier New" pitchFamily="49" charset="0"/>
-                <a:cs typeface="Courier New" pitchFamily="49" charset="0"/>
-              </a:rPr>
-              <a:t> </a:t>
-            </a:r>
-            <a:r>
-              <a:rPr lang="en-US" sz="1600" b="1" dirty="0">
-                <a:solidFill>
-                  <a:schemeClr val="bg1"/>
-                </a:solidFill>
-                <a:latin typeface="Courier New" pitchFamily="49" charset="0"/>
-                <a:cs typeface="Courier New" pitchFamily="49" charset="0"/>
-              </a:rPr>
-              <a:t>#BIT4, &amp;P1DIR </a:t>
-            </a:r>
-            <a:endParaRPr lang="en-US" sz="1600" b="1" dirty="0" smtClean="0">
-              <a:solidFill>
-                <a:schemeClr val="bg1"/>
-              </a:solidFill>
-              <a:latin typeface="Courier New" pitchFamily="49" charset="0"/>
-              <a:cs typeface="Courier New" pitchFamily="49" charset="0"/>
-            </a:endParaRPr>
-          </a:p>
-          <a:p>
-            <a:r>
-              <a:rPr lang="en-US" sz="1600" b="1" dirty="0" smtClean="0">
-                <a:solidFill>
-                  <a:schemeClr val="bg1"/>
-                </a:solidFill>
-                <a:latin typeface="Courier New" pitchFamily="49" charset="0"/>
-                <a:cs typeface="Courier New" pitchFamily="49" charset="0"/>
-              </a:rPr>
-              <a:t>        </a:t>
-            </a:r>
-            <a:r>
-              <a:rPr lang="en-US" sz="1600" b="1" dirty="0" err="1" smtClean="0">
-                <a:solidFill>
-                  <a:schemeClr val="bg1"/>
-                </a:solidFill>
-                <a:latin typeface="Courier New" pitchFamily="49" charset="0"/>
-                <a:cs typeface="Courier New" pitchFamily="49" charset="0"/>
-              </a:rPr>
-              <a:t>bis.b</a:t>
-            </a:r>
-            <a:r>
-              <a:rPr lang="en-US" sz="1600" b="1" dirty="0" smtClean="0">
-                <a:solidFill>
-                  <a:schemeClr val="bg1"/>
-                </a:solidFill>
-                <a:latin typeface="Courier New" pitchFamily="49" charset="0"/>
-                <a:cs typeface="Courier New" pitchFamily="49" charset="0"/>
-              </a:rPr>
-              <a:t> </a:t>
-            </a:r>
-            <a:r>
-              <a:rPr lang="en-US" sz="1600" b="1" dirty="0">
-                <a:solidFill>
-                  <a:schemeClr val="bg1"/>
-                </a:solidFill>
-                <a:latin typeface="Courier New" pitchFamily="49" charset="0"/>
-                <a:cs typeface="Courier New" pitchFamily="49" charset="0"/>
-              </a:rPr>
-              <a:t>#BIT4, &amp;P1SEL </a:t>
-            </a:r>
-            <a:endParaRPr lang="en-US" sz="1600" b="1" dirty="0" smtClean="0">
-              <a:solidFill>
-                <a:schemeClr val="bg1"/>
-              </a:solidFill>
-              <a:latin typeface="Courier New" pitchFamily="49" charset="0"/>
-              <a:cs typeface="Courier New" pitchFamily="49" charset="0"/>
-            </a:endParaRPr>
-          </a:p>
-          <a:p>
-            <a:r>
-              <a:rPr lang="en-US" sz="1600" b="1" dirty="0" smtClean="0">
-                <a:solidFill>
-                  <a:schemeClr val="bg1"/>
-                </a:solidFill>
-                <a:latin typeface="Courier New" pitchFamily="49" charset="0"/>
-                <a:cs typeface="Courier New" pitchFamily="49" charset="0"/>
-              </a:rPr>
-              <a:t>forever </a:t>
-            </a:r>
-            <a:r>
-              <a:rPr lang="en-US" sz="1600" b="1" dirty="0" err="1">
-                <a:solidFill>
-                  <a:schemeClr val="bg1"/>
-                </a:solidFill>
-                <a:latin typeface="Courier New" pitchFamily="49" charset="0"/>
-                <a:cs typeface="Courier New" pitchFamily="49" charset="0"/>
-              </a:rPr>
-              <a:t>jmp</a:t>
-            </a:r>
-            <a:r>
-              <a:rPr lang="en-US" sz="1600" b="1" dirty="0">
-                <a:solidFill>
-                  <a:schemeClr val="bg1"/>
-                </a:solidFill>
-                <a:latin typeface="Courier New" pitchFamily="49" charset="0"/>
-                <a:cs typeface="Courier New" pitchFamily="49" charset="0"/>
-              </a:rPr>
-              <a:t> </a:t>
-            </a:r>
-            <a:r>
-              <a:rPr lang="en-US" sz="1600" b="1" dirty="0" smtClean="0">
-                <a:solidFill>
-                  <a:schemeClr val="bg1"/>
-                </a:solidFill>
-                <a:latin typeface="Courier New" pitchFamily="49" charset="0"/>
-                <a:cs typeface="Courier New" pitchFamily="49" charset="0"/>
-              </a:rPr>
-              <a:t>forever</a:t>
-            </a:r>
-          </a:p>
-          <a:p>
-            <a:endParaRPr lang="en-US" sz="1600" b="1" dirty="0">
-              <a:solidFill>
-                <a:schemeClr val="bg1"/>
-              </a:solidFill>
-              <a:latin typeface="Courier New" pitchFamily="49" charset="0"/>
-              <a:cs typeface="Courier New" pitchFamily="49" charset="0"/>
-            </a:endParaRPr>
-          </a:p>
-        </p:txBody>
-      </p:sp>
     </p:spTree>
     <p:extLst>
       <p:ext uri="{BB962C8B-B14F-4D97-AF65-F5344CB8AC3E}">
-        <p14:creationId xmlns:p14="http://schemas.microsoft.com/office/powerpoint/2010/main" val="3224158464"/>
+        <p14:creationId xmlns:p14="http://schemas.microsoft.com/office/powerpoint/2010/main" val="2327061822"/>
       </p:ext>
     </p:extLst>
   </p:cSld>
@@ -6560,8 +6631,417 @@
           <a:lstStyle/>
           <a:p>
             <a:r>
+              <a:rPr lang="en-US" b="1" dirty="0" smtClean="0"/>
+              <a:t>Measure SMCLK</a:t>
+            </a:r>
+            <a:endParaRPr lang="en-US" dirty="0"/>
+          </a:p>
+        </p:txBody>
+      </p:sp>
+      <p:sp>
+        <p:nvSpPr>
+          <p:cNvPr id="3" name="Content Placeholder 2"/>
+          <p:cNvSpPr>
+            <a:spLocks noGrp="1"/>
+          </p:cNvSpPr>
+          <p:nvPr>
+            <p:ph idx="1"/>
+          </p:nvPr>
+        </p:nvSpPr>
+        <p:spPr>
+          <a:xfrm>
+            <a:off x="395177" y="669852"/>
+            <a:ext cx="8493642" cy="4724400"/>
+          </a:xfrm>
+        </p:spPr>
+        <p:txBody>
+          <a:bodyPr/>
+          <a:lstStyle/>
+          <a:p>
+            <a:r>
+              <a:rPr lang="en-US" sz="1600" dirty="0" smtClean="0"/>
+              <a:t>Hook </a:t>
+            </a:r>
+            <a:r>
+              <a:rPr lang="en-US" sz="1600" dirty="0"/>
+              <a:t>up the black Ground wire on Pod 1 to ground on the </a:t>
+            </a:r>
+            <a:r>
+              <a:rPr lang="en-US" sz="1600" dirty="0" smtClean="0"/>
+              <a:t>MSP430</a:t>
+            </a:r>
+          </a:p>
+          <a:p>
+            <a:r>
+              <a:rPr lang="en-US" sz="1600" dirty="0" smtClean="0"/>
+              <a:t>Hook </a:t>
+            </a:r>
+            <a:r>
+              <a:rPr lang="en-US" sz="1600" dirty="0"/>
+              <a:t>up Pod 1 </a:t>
+            </a:r>
+            <a:r>
+              <a:rPr lang="en-US" sz="1600" dirty="0" smtClean="0"/>
+              <a:t>Wire </a:t>
+            </a:r>
+            <a:r>
+              <a:rPr lang="en-US" sz="1600" dirty="0"/>
+              <a:t>0 to </a:t>
+            </a:r>
+            <a:r>
+              <a:rPr lang="en-US" sz="1600" dirty="0" smtClean="0"/>
+              <a:t>P1.4 (SMCLK)</a:t>
+            </a:r>
+          </a:p>
+          <a:p>
+            <a:r>
+              <a:rPr lang="en-US" sz="1600" dirty="0" smtClean="0"/>
+              <a:t>Sampling </a:t>
+            </a:r>
+            <a:r>
+              <a:rPr lang="en-US" sz="1600" dirty="0"/>
+              <a:t>setup </a:t>
+            </a:r>
+            <a:r>
+              <a:rPr lang="en-US" sz="1600" dirty="0" smtClean="0"/>
+              <a:t>screen: set </a:t>
+            </a:r>
+            <a:r>
+              <a:rPr lang="en-US" sz="1600" dirty="0"/>
+              <a:t>the sampling speed to be the fastest possible (once every 2ns</a:t>
+            </a:r>
+            <a:r>
+              <a:rPr lang="en-US" sz="1600" dirty="0" smtClean="0"/>
+              <a:t>)</a:t>
+            </a:r>
+          </a:p>
+          <a:p>
+            <a:r>
+              <a:rPr lang="en-US" sz="1600" dirty="0"/>
+              <a:t>Waveform screen and set the trigger on my </a:t>
+            </a:r>
+            <a:r>
+              <a:rPr lang="en-US" sz="1600" dirty="0" smtClean="0"/>
+              <a:t>signal </a:t>
+            </a:r>
+            <a:r>
+              <a:rPr lang="en-US" sz="1600" dirty="0"/>
+              <a:t>to be falling </a:t>
+            </a:r>
+            <a:r>
+              <a:rPr lang="en-US" sz="1600" dirty="0" smtClean="0"/>
+              <a:t>edge</a:t>
+            </a:r>
+          </a:p>
+          <a:p>
+            <a:r>
+              <a:rPr lang="en-US" sz="1600" dirty="0"/>
+              <a:t>Run Single button </a:t>
+            </a:r>
+            <a:endParaRPr lang="en-US" sz="1600" dirty="0" smtClean="0"/>
+          </a:p>
+          <a:p>
+            <a:r>
+              <a:rPr lang="en-US" sz="1600" dirty="0"/>
+              <a:t>D</a:t>
+            </a:r>
+            <a:r>
+              <a:rPr lang="en-US" sz="1600" dirty="0" smtClean="0"/>
+              <a:t>rag </a:t>
+            </a:r>
+            <a:r>
+              <a:rPr lang="en-US" sz="1600" dirty="0"/>
+              <a:t>markers to measure falling edge to falling edge </a:t>
+            </a:r>
+            <a:r>
+              <a:rPr lang="en-US" sz="1600" dirty="0" smtClean="0"/>
+              <a:t>of SMCLK</a:t>
+            </a:r>
+            <a:endParaRPr lang="en-US" sz="1600" dirty="0"/>
+          </a:p>
+        </p:txBody>
+      </p:sp>
+      <p:pic>
+        <p:nvPicPr>
+          <p:cNvPr id="4099" name="Picture 3"/>
+          <p:cNvPicPr>
+            <a:picLocks noChangeAspect="1" noChangeArrowheads="1"/>
+          </p:cNvPicPr>
+          <p:nvPr/>
+        </p:nvPicPr>
+        <p:blipFill>
+          <a:blip r:embed="rId2">
+            <a:extLst>
+              <a:ext uri="{28A0092B-C50C-407E-A947-70E740481C1C}">
+                <a14:useLocalDpi xmlns:a14="http://schemas.microsoft.com/office/drawing/2010/main" val="0"/>
+              </a:ext>
+            </a:extLst>
+          </a:blip>
+          <a:srcRect/>
+          <a:stretch>
+            <a:fillRect/>
+          </a:stretch>
+        </p:blipFill>
+        <p:spPr bwMode="auto">
+          <a:xfrm>
+            <a:off x="552956" y="2403027"/>
+            <a:ext cx="8232297" cy="6174223"/>
+          </a:xfrm>
+          <a:prstGeom prst="rect">
+            <a:avLst/>
+          </a:prstGeom>
+          <a:noFill/>
+          <a:ln>
+            <a:noFill/>
+          </a:ln>
+          <a:extLst>
+            <a:ext uri="{909E8E84-426E-40DD-AFC4-6F175D3DCCD1}">
+              <a14:hiddenFill xmlns:a14="http://schemas.microsoft.com/office/drawing/2010/main">
+                <a:solidFill>
+                  <a:schemeClr val="accent1"/>
+                </a:solidFill>
+              </a14:hiddenFill>
+            </a:ext>
+            <a:ext uri="{91240B29-F687-4F45-9708-019B960494DF}">
+              <a14:hiddenLine xmlns:a14="http://schemas.microsoft.com/office/drawing/2010/main" w="9525">
+                <a:solidFill>
+                  <a:schemeClr val="tx1"/>
+                </a:solidFill>
+                <a:miter lim="800000"/>
+                <a:headEnd/>
+                <a:tailEnd/>
+              </a14:hiddenLine>
+            </a:ext>
+          </a:extLst>
+        </p:spPr>
+      </p:pic>
+      <p:sp>
+        <p:nvSpPr>
+          <p:cNvPr id="4" name="TextBox 3"/>
+          <p:cNvSpPr txBox="1"/>
+          <p:nvPr/>
+        </p:nvSpPr>
+        <p:spPr>
+          <a:xfrm>
+            <a:off x="2581360" y="4766864"/>
+            <a:ext cx="4709564" cy="1446550"/>
+          </a:xfrm>
+          <a:prstGeom prst="rect">
+            <a:avLst/>
+          </a:prstGeom>
+          <a:noFill/>
+        </p:spPr>
+        <p:txBody>
+          <a:bodyPr wrap="square" rtlCol="0">
+            <a:spAutoFit/>
+          </a:bodyPr>
+          <a:lstStyle/>
+          <a:p>
+            <a:r>
+              <a:rPr lang="en-US" sz="1600" b="1" dirty="0" smtClean="0">
+                <a:solidFill>
+                  <a:schemeClr val="bg1"/>
+                </a:solidFill>
+                <a:latin typeface="Courier New" pitchFamily="49" charset="0"/>
+                <a:cs typeface="Courier New" pitchFamily="49" charset="0"/>
+              </a:rPr>
+              <a:t>        </a:t>
+            </a:r>
+            <a:r>
+              <a:rPr lang="en-US" sz="1600" b="1" dirty="0" err="1" smtClean="0">
+                <a:solidFill>
+                  <a:schemeClr val="bg1"/>
+                </a:solidFill>
+                <a:latin typeface="Courier New" pitchFamily="49" charset="0"/>
+                <a:cs typeface="Courier New" pitchFamily="49" charset="0"/>
+              </a:rPr>
+              <a:t>bis.b</a:t>
+            </a:r>
+            <a:r>
+              <a:rPr lang="en-US" sz="1600" b="1" dirty="0" smtClean="0">
+                <a:solidFill>
+                  <a:schemeClr val="bg1"/>
+                </a:solidFill>
+                <a:latin typeface="Courier New" pitchFamily="49" charset="0"/>
+                <a:cs typeface="Courier New" pitchFamily="49" charset="0"/>
+              </a:rPr>
+              <a:t> </a:t>
+            </a:r>
+            <a:r>
+              <a:rPr lang="en-US" sz="1600" b="1" dirty="0">
+                <a:solidFill>
+                  <a:schemeClr val="bg1"/>
+                </a:solidFill>
+                <a:latin typeface="Courier New" pitchFamily="49" charset="0"/>
+                <a:cs typeface="Courier New" pitchFamily="49" charset="0"/>
+              </a:rPr>
+              <a:t>#BIT4, &amp;P1DIR </a:t>
+            </a:r>
+            <a:endParaRPr lang="en-US" sz="1600" b="1" dirty="0" smtClean="0">
+              <a:solidFill>
+                <a:schemeClr val="bg1"/>
+              </a:solidFill>
+              <a:latin typeface="Courier New" pitchFamily="49" charset="0"/>
+              <a:cs typeface="Courier New" pitchFamily="49" charset="0"/>
+            </a:endParaRPr>
+          </a:p>
+          <a:p>
+            <a:r>
+              <a:rPr lang="en-US" sz="1600" b="1" dirty="0" smtClean="0">
+                <a:solidFill>
+                  <a:schemeClr val="bg1"/>
+                </a:solidFill>
+                <a:latin typeface="Courier New" pitchFamily="49" charset="0"/>
+                <a:cs typeface="Courier New" pitchFamily="49" charset="0"/>
+              </a:rPr>
+              <a:t>        </a:t>
+            </a:r>
+            <a:r>
+              <a:rPr lang="en-US" sz="1600" b="1" dirty="0" err="1" smtClean="0">
+                <a:solidFill>
+                  <a:schemeClr val="bg1"/>
+                </a:solidFill>
+                <a:latin typeface="Courier New" pitchFamily="49" charset="0"/>
+                <a:cs typeface="Courier New" pitchFamily="49" charset="0"/>
+              </a:rPr>
+              <a:t>bis.b</a:t>
+            </a:r>
+            <a:r>
+              <a:rPr lang="en-US" sz="1600" b="1" dirty="0" smtClean="0">
+                <a:solidFill>
+                  <a:schemeClr val="bg1"/>
+                </a:solidFill>
+                <a:latin typeface="Courier New" pitchFamily="49" charset="0"/>
+                <a:cs typeface="Courier New" pitchFamily="49" charset="0"/>
+              </a:rPr>
+              <a:t> </a:t>
+            </a:r>
+            <a:r>
+              <a:rPr lang="en-US" sz="1600" b="1" dirty="0">
+                <a:solidFill>
+                  <a:schemeClr val="bg1"/>
+                </a:solidFill>
+                <a:latin typeface="Courier New" pitchFamily="49" charset="0"/>
+                <a:cs typeface="Courier New" pitchFamily="49" charset="0"/>
+              </a:rPr>
+              <a:t>#BIT4, &amp;P1SEL </a:t>
+            </a:r>
+            <a:endParaRPr lang="en-US" sz="1600" b="1" dirty="0" smtClean="0">
+              <a:solidFill>
+                <a:schemeClr val="bg1"/>
+              </a:solidFill>
+              <a:latin typeface="Courier New" pitchFamily="49" charset="0"/>
+              <a:cs typeface="Courier New" pitchFamily="49" charset="0"/>
+            </a:endParaRPr>
+          </a:p>
+          <a:p>
+            <a:r>
+              <a:rPr lang="en-US" sz="1600" b="1" dirty="0" smtClean="0">
+                <a:solidFill>
+                  <a:schemeClr val="bg1"/>
+                </a:solidFill>
+                <a:latin typeface="Courier New" pitchFamily="49" charset="0"/>
+                <a:cs typeface="Courier New" pitchFamily="49" charset="0"/>
+              </a:rPr>
+              <a:t>forever </a:t>
+            </a:r>
+            <a:r>
+              <a:rPr lang="en-US" sz="1600" b="1" dirty="0" err="1">
+                <a:solidFill>
+                  <a:schemeClr val="bg1"/>
+                </a:solidFill>
+                <a:latin typeface="Courier New" pitchFamily="49" charset="0"/>
+                <a:cs typeface="Courier New" pitchFamily="49" charset="0"/>
+              </a:rPr>
+              <a:t>jmp</a:t>
+            </a:r>
+            <a:r>
+              <a:rPr lang="en-US" sz="1600" b="1" dirty="0">
+                <a:solidFill>
+                  <a:schemeClr val="bg1"/>
+                </a:solidFill>
+                <a:latin typeface="Courier New" pitchFamily="49" charset="0"/>
+                <a:cs typeface="Courier New" pitchFamily="49" charset="0"/>
+              </a:rPr>
+              <a:t> </a:t>
+            </a:r>
+            <a:r>
+              <a:rPr lang="en-US" sz="1600" b="1" dirty="0" smtClean="0">
+                <a:solidFill>
+                  <a:schemeClr val="bg1"/>
+                </a:solidFill>
+                <a:latin typeface="Courier New" pitchFamily="49" charset="0"/>
+                <a:cs typeface="Courier New" pitchFamily="49" charset="0"/>
+              </a:rPr>
+              <a:t>forever</a:t>
+            </a:r>
+          </a:p>
+          <a:p>
+            <a:endParaRPr lang="en-US" sz="1600" b="1" dirty="0">
+              <a:solidFill>
+                <a:schemeClr val="bg1"/>
+              </a:solidFill>
+              <a:latin typeface="Courier New" pitchFamily="49" charset="0"/>
+              <a:cs typeface="Courier New" pitchFamily="49" charset="0"/>
+            </a:endParaRPr>
+          </a:p>
+        </p:txBody>
+      </p:sp>
+    </p:spTree>
+    <p:extLst>
+      <p:ext uri="{BB962C8B-B14F-4D97-AF65-F5344CB8AC3E}">
+        <p14:creationId xmlns:p14="http://schemas.microsoft.com/office/powerpoint/2010/main" val="3224158464"/>
+      </p:ext>
+    </p:extLst>
+  </p:cSld>
+  <p:clrMapOvr>
+    <a:masterClrMapping/>
+  </p:clrMapOvr>
+  <p:timing>
+    <p:tnLst>
+      <p:par>
+        <p:cTn id="1" dur="indefinite" restart="never" nodeType="tmRoot"/>
+      </p:par>
+    </p:tnLst>
+  </p:timing>
+</p:sld>
+</file>
+
+<file path=ppt/slides/slide17.xml><?xml version="1.0" encoding="utf-8"?>
+<p:sld xmlns:a="http://schemas.openxmlformats.org/drawingml/2006/main" xmlns:r="http://schemas.openxmlformats.org/officeDocument/2006/relationships" xmlns:p="http://schemas.openxmlformats.org/presentationml/2006/main">
+  <p:cSld>
+    <p:spTree>
+      <p:nvGrpSpPr>
+        <p:cNvPr id="1" name=""/>
+        <p:cNvGrpSpPr/>
+        <p:nvPr/>
+      </p:nvGrpSpPr>
+      <p:grpSpPr>
+        <a:xfrm>
+          <a:off x="0" y="0"/>
+          <a:ext cx="0" cy="0"/>
+          <a:chOff x="0" y="0"/>
+          <a:chExt cx="0" cy="0"/>
+        </a:xfrm>
+      </p:grpSpPr>
+      <p:sp>
+        <p:nvSpPr>
+          <p:cNvPr id="2" name="Title 1"/>
+          <p:cNvSpPr>
+            <a:spLocks noGrp="1"/>
+          </p:cNvSpPr>
+          <p:nvPr>
+            <p:ph type="title"/>
+          </p:nvPr>
+        </p:nvSpPr>
+        <p:spPr/>
+        <p:txBody>
+          <a:bodyPr/>
+          <a:lstStyle/>
+          <a:p>
+            <a:r>
               <a:rPr lang="en-US" dirty="0" smtClean="0"/>
-              <a:t>Lab3 (in draft)</a:t>
+              <a:t>Lab3</a:t>
             </a:r>
             <a:endParaRPr lang="en-US" dirty="0"/>
           </a:p>
@@ -6583,16 +7063,10 @@
           <a:lstStyle/>
           <a:p>
             <a:r>
-              <a:rPr lang="en-US" dirty="0">
-                <a:hlinkClick r:id="rId2"/>
-              </a:rPr>
-              <a:t>http://</a:t>
-            </a:r>
-            <a:r>
               <a:rPr lang="en-US" dirty="0" smtClean="0">
                 <a:hlinkClick r:id="rId2"/>
               </a:rPr>
-              <a:t>ecse.bd.psu.edu/cmpen352/lab/lab3/inlab3.html</a:t>
+              <a:t>http://ece.ninja/382/labs/lab3/index.html</a:t>
             </a:r>
             <a:endParaRPr lang="en-US" dirty="0" smtClean="0"/>
           </a:p>
@@ -6617,6 +7091,13 @@
   <p:clrMapOvr>
     <a:masterClrMapping/>
   </p:clrMapOvr>
+  <p:timing>
+    <p:tnLst>
+      <p:par>
+        <p:cTn id="1" dur="indefinite" restart="never" nodeType="tmRoot"/>
+      </p:par>
+    </p:tnLst>
+  </p:timing>
 </p:sld>
 </file>
 
@@ -6828,7 +7309,27 @@
                 <a:latin typeface="Courier New" pitchFamily="49" charset="0"/>
                 <a:cs typeface="Courier New" pitchFamily="49" charset="0"/>
               </a:rPr>
-              <a:t>:   pass-by-reference and pass-by-value</a:t>
+              <a:t>:   pass-by-reference and pass-by-value; using labels to refer to location of the encrypted and decrypted </a:t>
+            </a:r>
+            <a:r>
+              <a:rPr lang="en-US" sz="1400" dirty="0" err="1" smtClean="0">
+                <a:solidFill>
+                  <a:schemeClr val="accent2"/>
+                </a:solidFill>
+                <a:latin typeface="Courier New" pitchFamily="49" charset="0"/>
+                <a:cs typeface="Courier New" pitchFamily="49" charset="0"/>
+              </a:rPr>
+              <a:t>messsages</a:t>
+            </a:r>
+            <a:r>
+              <a:rPr lang="en-US" sz="1400" dirty="0" smtClean="0">
+                <a:solidFill>
+                  <a:schemeClr val="accent2"/>
+                </a:solidFill>
+                <a:latin typeface="Courier New" pitchFamily="49" charset="0"/>
+                <a:cs typeface="Courier New" pitchFamily="49" charset="0"/>
+              </a:rPr>
+              <a:t> and the key; committing early and often.</a:t>
             </a:r>
             <a:endParaRPr lang="en-US" sz="1400" dirty="0">
               <a:solidFill>
@@ -6863,14 +7364,7 @@
                 <a:latin typeface="Courier New" pitchFamily="49" charset="0"/>
                 <a:cs typeface="Courier New" pitchFamily="49" charset="0"/>
               </a:rPr>
-              <a:t>Header: Which </a:t>
-            </a:r>
-            <a:r>
-              <a:rPr lang="en-US" sz="1400" b="1" dirty="0" smtClean="0">
-                <a:latin typeface="Courier New" pitchFamily="49" charset="0"/>
-                <a:cs typeface="Courier New" pitchFamily="49" charset="0"/>
-              </a:rPr>
-              <a:t>is the best</a:t>
+              <a:t>Header: Which is the best</a:t>
             </a:r>
             <a:r>
               <a:rPr lang="en-US" sz="1400" dirty="0" smtClean="0">
@@ -6897,13 +7391,6 @@
               </a:rPr>
               <a:t>Choice A</a:t>
             </a:r>
-            <a:endParaRPr lang="en-US" sz="1400" dirty="0" smtClean="0">
-              <a:solidFill>
-                <a:schemeClr val="accent2"/>
-              </a:solidFill>
-              <a:latin typeface="Courier New" pitchFamily="49" charset="0"/>
-              <a:cs typeface="Courier New" pitchFamily="49" charset="0"/>
-            </a:endParaRPr>
           </a:p>
           <a:p>
             <a:pPr marL="400050" lvl="1" indent="0">
@@ -7022,7 +7509,7 @@
         </p:nvGraphicFramePr>
         <p:xfrm>
           <a:off x="1308887" y="1308550"/>
-          <a:ext cx="2971799" cy="2043557"/>
+          <a:ext cx="2971799" cy="2113280"/>
         </p:xfrm>
         <a:graphic>
           <a:graphicData uri="http://schemas.openxmlformats.org/drawingml/2006/table">
@@ -8080,7 +8567,7 @@
         </p:nvSpPr>
         <p:spPr>
           <a:xfrm>
-            <a:off x="3374378" y="4224043"/>
+            <a:off x="3696353" y="4661929"/>
             <a:ext cx="4952326" cy="1923604"/>
           </a:xfrm>
           <a:prstGeom prst="rect">
@@ -8345,6 +8832,13 @@
   <p:clrMapOvr>
     <a:masterClrMapping/>
   </p:clrMapOvr>
+  <p:timing>
+    <p:tnLst>
+      <p:par>
+        <p:cTn id="1" dur="indefinite" restart="never" nodeType="tmRoot"/>
+      </p:par>
+    </p:tnLst>
+  </p:timing>
 </p:sld>
 </file>
 
@@ -8821,13 +9315,6 @@
               </a:rPr>
               <a:t>    c0b8:    30 41           ret</a:t>
             </a:r>
-            <a:endParaRPr lang="en-US" sz="1400" b="1" dirty="0">
-              <a:solidFill>
-                <a:schemeClr val="accent2"/>
-              </a:solidFill>
-              <a:latin typeface="Courier New" pitchFamily="49" charset="0"/>
-              <a:cs typeface="Courier New" pitchFamily="49" charset="0"/>
-            </a:endParaRPr>
           </a:p>
         </p:txBody>
       </p:sp>
@@ -8841,6 +9328,13 @@
   <p:clrMapOvr>
     <a:masterClrMapping/>
   </p:clrMapOvr>
+  <p:timing>
+    <p:tnLst>
+      <p:par>
+        <p:cTn id="1" dur="indefinite" restart="never" nodeType="tmRoot"/>
+      </p:par>
+    </p:tnLst>
+  </p:timing>
 </p:sld>
 </file>
 
@@ -9726,6 +10220,13 @@
   <p:clrMapOvr>
     <a:masterClrMapping/>
   </p:clrMapOvr>
+  <p:timing>
+    <p:tnLst>
+      <p:par>
+        <p:cTn id="1" dur="indefinite" restart="never" nodeType="tmRoot"/>
+      </p:par>
+    </p:tnLst>
+  </p:timing>
 </p:sld>
 </file>
 
@@ -10668,6 +11169,13 @@
   <p:clrMapOvr>
     <a:masterClrMapping/>
   </p:clrMapOvr>
+  <p:timing>
+    <p:tnLst>
+      <p:par>
+        <p:cTn id="1" dur="indefinite" restart="never" nodeType="tmRoot"/>
+      </p:par>
+    </p:tnLst>
+  </p:timing>
 </p:sld>
 </file>
 
@@ -10908,8 +11416,8 @@
         </p:blipFill>
         <p:spPr bwMode="auto">
           <a:xfrm>
-            <a:off x="2429437" y="1549653"/>
-            <a:ext cx="3790950" cy="1485900"/>
+            <a:off x="1991458" y="1596351"/>
+            <a:ext cx="4666908" cy="1829240"/>
           </a:xfrm>
           <a:prstGeom prst="rect">
             <a:avLst/>
@@ -11003,6 +11511,13 @@
   <p:clrMapOvr>
     <a:masterClrMapping/>
   </p:clrMapOvr>
+  <p:timing>
+    <p:tnLst>
+      <p:par>
+        <p:cTn id="1" dur="indefinite" restart="never" nodeType="tmRoot"/>
+      </p:par>
+    </p:tnLst>
+  </p:timing>
 </p:sld>
 </file>
 
@@ -11197,6 +11712,13 @@
   <p:clrMapOvr>
     <a:masterClrMapping/>
   </p:clrMapOvr>
+  <p:timing>
+    <p:tnLst>
+      <p:par>
+        <p:cTn id="1" dur="indefinite" restart="never" nodeType="tmRoot"/>
+      </p:par>
+    </p:tnLst>
+  </p:timing>
 </p:sld>
 </file>
 
@@ -11514,6 +12036,107 @@
           </a:extLst>
         </p:spPr>
       </p:pic>
+      <p:sp>
+        <p:nvSpPr>
+          <p:cNvPr id="4" name="TextBox 3"/>
+          <p:cNvSpPr txBox="1"/>
+          <p:nvPr/>
+        </p:nvSpPr>
+        <p:spPr>
+          <a:xfrm>
+            <a:off x="4331856" y="795901"/>
+            <a:ext cx="4378817" cy="461665"/>
+          </a:xfrm>
+          <a:prstGeom prst="rect">
+            <a:avLst/>
+          </a:prstGeom>
+          <a:noFill/>
+        </p:spPr>
+        <p:txBody>
+          <a:bodyPr wrap="square" rtlCol="0">
+            <a:spAutoFit/>
+          </a:bodyPr>
+          <a:lstStyle/>
+          <a:p>
+            <a:r>
+              <a:rPr lang="en-US" dirty="0" smtClean="0"/>
+              <a:t>Page 35 of LCD Driver </a:t>
+            </a:r>
+            <a:endParaRPr lang="en-US" dirty="0"/>
+          </a:p>
+        </p:txBody>
+      </p:sp>
+      <p:sp>
+        <p:nvSpPr>
+          <p:cNvPr id="6" name="TextBox 5"/>
+          <p:cNvSpPr txBox="1"/>
+          <p:nvPr/>
+        </p:nvSpPr>
+        <p:spPr>
+          <a:xfrm>
+            <a:off x="4148919" y="4184265"/>
+            <a:ext cx="4995081" cy="830997"/>
+          </a:xfrm>
+          <a:prstGeom prst="rect">
+            <a:avLst/>
+          </a:prstGeom>
+          <a:noFill/>
+        </p:spPr>
+        <p:txBody>
+          <a:bodyPr wrap="square" rtlCol="0">
+            <a:spAutoFit/>
+          </a:bodyPr>
+          <a:lstStyle/>
+          <a:p>
+            <a:r>
+              <a:rPr lang="en-US" dirty="0" smtClean="0"/>
+              <a:t>Control Register:  Page 445 of the Family User </a:t>
+            </a:r>
+            <a:r>
+              <a:rPr lang="en-US" dirty="0"/>
+              <a:t>Guide (Blue book pp 73) </a:t>
+            </a:r>
+          </a:p>
+        </p:txBody>
+      </p:sp>
+      <p:sp>
+        <p:nvSpPr>
+          <p:cNvPr id="8" name="TextBox 7"/>
+          <p:cNvSpPr txBox="1"/>
+          <p:nvPr/>
+        </p:nvSpPr>
+        <p:spPr>
+          <a:xfrm>
+            <a:off x="5267458" y="5482884"/>
+            <a:ext cx="2987899" cy="1200329"/>
+          </a:xfrm>
+          <a:prstGeom prst="rect">
+            <a:avLst/>
+          </a:prstGeom>
+          <a:noFill/>
+        </p:spPr>
+        <p:txBody>
+          <a:bodyPr wrap="square" rtlCol="0">
+            <a:spAutoFit/>
+          </a:bodyPr>
+          <a:lstStyle/>
+          <a:p>
+            <a:r>
+              <a:rPr lang="en-US" dirty="0" smtClean="0"/>
+              <a:t>SPI:  Page 436 of the Family User Guide (</a:t>
+            </a:r>
+            <a:r>
+              <a:rPr lang="en-US" dirty="0"/>
+              <a:t>Blue book pp </a:t>
+            </a:r>
+            <a:r>
+              <a:rPr lang="en-US" dirty="0" smtClean="0"/>
+              <a:t>69) </a:t>
+            </a:r>
+            <a:endParaRPr lang="en-US" dirty="0"/>
+          </a:p>
+        </p:txBody>
+      </p:sp>
     </p:spTree>
     <p:extLst>
       <p:ext uri="{BB962C8B-B14F-4D97-AF65-F5344CB8AC3E}">
@@ -11524,6 +12147,176 @@
   <p:clrMapOvr>
     <a:masterClrMapping/>
   </p:clrMapOvr>
+  <p:timing>
+    <p:tnLst>
+      <p:par>
+        <p:cTn id="1" dur="indefinite" restart="never" nodeType="tmRoot">
+          <p:childTnLst>
+            <p:seq concurrent="1" nextAc="seek">
+              <p:cTn id="2" dur="indefinite" nodeType="mainSeq">
+                <p:childTnLst>
+                  <p:par>
+                    <p:cTn id="3" fill="hold">
+                      <p:stCondLst>
+                        <p:cond delay="indefinite"/>
+                      </p:stCondLst>
+                      <p:childTnLst>
+                        <p:par>
+                          <p:cTn id="4" fill="hold">
+                            <p:stCondLst>
+                              <p:cond delay="0"/>
+                            </p:stCondLst>
+                            <p:childTnLst>
+                              <p:par>
+                                <p:cTn id="5" presetID="1" presetClass="entr" presetSubtype="0" fill="hold" grpId="0" nodeType="clickEffect">
+                                  <p:stCondLst>
+                                    <p:cond delay="0"/>
+                                  </p:stCondLst>
+                                  <p:childTnLst>
+                                    <p:set>
+                                      <p:cBhvr>
+                                        <p:cTn id="6" dur="1" fill="hold">
+                                          <p:stCondLst>
+                                            <p:cond delay="0"/>
+                                          </p:stCondLst>
+                                        </p:cTn>
+                                        <p:tgtEl>
+                                          <p:spTgt spid="4"/>
+                                        </p:tgtEl>
+                                        <p:attrNameLst>
+                                          <p:attrName>style.visibility</p:attrName>
+                                        </p:attrNameLst>
+                                      </p:cBhvr>
+                                      <p:to>
+                                        <p:strVal val="visible"/>
+                                      </p:to>
+                                    </p:set>
+                                  </p:childTnLst>
+                                </p:cTn>
+                              </p:par>
+                            </p:childTnLst>
+                          </p:cTn>
+                        </p:par>
+                      </p:childTnLst>
+                    </p:cTn>
+                  </p:par>
+                  <p:par>
+                    <p:cTn id="7" fill="hold">
+                      <p:stCondLst>
+                        <p:cond delay="indefinite"/>
+                      </p:stCondLst>
+                      <p:childTnLst>
+                        <p:par>
+                          <p:cTn id="8" fill="hold">
+                            <p:stCondLst>
+                              <p:cond delay="0"/>
+                            </p:stCondLst>
+                            <p:childTnLst>
+                              <p:par>
+                                <p:cTn id="9" presetID="1" presetClass="entr" presetSubtype="0" fill="hold" grpId="0" nodeType="clickEffect">
+                                  <p:stCondLst>
+                                    <p:cond delay="0"/>
+                                  </p:stCondLst>
+                                  <p:childTnLst>
+                                    <p:set>
+                                      <p:cBhvr>
+                                        <p:cTn id="10" dur="1" fill="hold">
+                                          <p:stCondLst>
+                                            <p:cond delay="0"/>
+                                          </p:stCondLst>
+                                        </p:cTn>
+                                        <p:tgtEl>
+                                          <p:spTgt spid="6"/>
+                                        </p:tgtEl>
+                                        <p:attrNameLst>
+                                          <p:attrName>style.visibility</p:attrName>
+                                        </p:attrNameLst>
+                                      </p:cBhvr>
+                                      <p:to>
+                                        <p:strVal val="visible"/>
+                                      </p:to>
+                                    </p:set>
+                                  </p:childTnLst>
+                                </p:cTn>
+                              </p:par>
+                            </p:childTnLst>
+                          </p:cTn>
+                        </p:par>
+                      </p:childTnLst>
+                    </p:cTn>
+                  </p:par>
+                  <p:par>
+                    <p:cTn id="11" fill="hold">
+                      <p:stCondLst>
+                        <p:cond delay="indefinite"/>
+                      </p:stCondLst>
+                      <p:childTnLst>
+                        <p:par>
+                          <p:cTn id="12" fill="hold">
+                            <p:stCondLst>
+                              <p:cond delay="0"/>
+                            </p:stCondLst>
+                            <p:childTnLst>
+                              <p:par>
+                                <p:cTn id="13" presetID="1" presetClass="entr" presetSubtype="0" fill="hold" grpId="0" nodeType="clickEffect">
+                                  <p:stCondLst>
+                                    <p:cond delay="0"/>
+                                  </p:stCondLst>
+                                  <p:childTnLst>
+                                    <p:set>
+                                      <p:cBhvr>
+                                        <p:cTn id="14" dur="1" fill="hold">
+                                          <p:stCondLst>
+                                            <p:cond delay="0"/>
+                                          </p:stCondLst>
+                                        </p:cTn>
+                                        <p:tgtEl>
+                                          <p:spTgt spid="8"/>
+                                        </p:tgtEl>
+                                        <p:attrNameLst>
+                                          <p:attrName>style.visibility</p:attrName>
+                                        </p:attrNameLst>
+                                      </p:cBhvr>
+                                      <p:to>
+                                        <p:strVal val="visible"/>
+                                      </p:to>
+                                    </p:set>
+                                  </p:childTnLst>
+                                </p:cTn>
+                              </p:par>
+                            </p:childTnLst>
+                          </p:cTn>
+                        </p:par>
+                      </p:childTnLst>
+                    </p:cTn>
+                  </p:par>
+                </p:childTnLst>
+              </p:cTn>
+              <p:prevCondLst>
+                <p:cond evt="onPrev" delay="0">
+                  <p:tgtEl>
+                    <p:sldTgt/>
+                  </p:tgtEl>
+                </p:cond>
+              </p:prevCondLst>
+              <p:nextCondLst>
+                <p:cond evt="onNext" delay="0">
+                  <p:tgtEl>
+                    <p:sldTgt/>
+                  </p:tgtEl>
+                </p:cond>
+              </p:nextCondLst>
+            </p:seq>
+          </p:childTnLst>
+        </p:cTn>
+      </p:par>
+    </p:tnLst>
+    <p:bldLst>
+      <p:bldP spid="4" grpId="0"/>
+      <p:bldP spid="6" grpId="0"/>
+      <p:bldP spid="8" grpId="0"/>
+    </p:bldLst>
+  </p:timing>
 </p:sld>
 </file>
 
@@ -11750,8 +12543,8 @@
         </p:blipFill>
         <p:spPr bwMode="auto">
           <a:xfrm>
-            <a:off x="1426023" y="3166163"/>
-            <a:ext cx="5476875" cy="1447801"/>
+            <a:off x="975263" y="3166162"/>
+            <a:ext cx="7656661" cy="2024023"/>
           </a:xfrm>
           <a:prstGeom prst="rect">
             <a:avLst/>
@@ -11768,6 +12561,48 @@
           </a:extLst>
         </p:spPr>
       </p:pic>
+      <p:sp>
+        <p:nvSpPr>
+          <p:cNvPr id="4" name="TextBox 3"/>
+          <p:cNvSpPr txBox="1"/>
+          <p:nvPr/>
+        </p:nvSpPr>
+        <p:spPr>
+          <a:xfrm>
+            <a:off x="4380930" y="5134573"/>
+            <a:ext cx="4763069" cy="830997"/>
+          </a:xfrm>
+          <a:prstGeom prst="rect">
+            <a:avLst/>
+          </a:prstGeom>
+          <a:noFill/>
+        </p:spPr>
+        <p:txBody>
+          <a:bodyPr wrap="square" rtlCol="0">
+            <a:spAutoFit/>
+          </a:bodyPr>
+          <a:lstStyle/>
+          <a:p>
+            <a:r>
+              <a:rPr lang="en-US" dirty="0"/>
+              <a:t>Page </a:t>
+            </a:r>
+            <a:r>
+              <a:rPr lang="en-US" dirty="0" smtClean="0"/>
+              <a:t>436 or 452 </a:t>
+            </a:r>
+            <a:r>
+              <a:rPr lang="en-US" dirty="0"/>
+              <a:t>of the Family User Guide (Blue book pp </a:t>
+            </a:r>
+            <a:r>
+              <a:rPr lang="en-US" dirty="0" smtClean="0"/>
+              <a:t>69 or 76)  </a:t>
+            </a:r>
+            <a:endParaRPr lang="en-US" dirty="0"/>
+          </a:p>
+        </p:txBody>
+      </p:sp>
     </p:spTree>
     <p:extLst>
       <p:ext uri="{BB962C8B-B14F-4D97-AF65-F5344CB8AC3E}">
@@ -11778,6 +12613,84 @@
   <p:clrMapOvr>
     <a:masterClrMapping/>
   </p:clrMapOvr>
+  <p:timing>
+    <p:tnLst>
+      <p:par>
+        <p:cTn id="1" dur="indefinite" restart="never" nodeType="tmRoot">
+          <p:childTnLst>
+            <p:seq concurrent="1" nextAc="seek">
+              <p:cTn id="2" dur="indefinite" nodeType="mainSeq">
+                <p:childTnLst>
+                  <p:par>
+                    <p:cTn id="3" fill="hold">
+                      <p:stCondLst>
+                        <p:cond delay="indefinite"/>
+                      </p:stCondLst>
+                      <p:childTnLst>
+                        <p:par>
+                          <p:cTn id="4" fill="hold">
+                            <p:stCondLst>
+                              <p:cond delay="0"/>
+                            </p:stCondLst>
+                            <p:childTnLst>
+                              <p:par>
+                                <p:cTn id="5" presetID="1" presetClass="entr" presetSubtype="0" fill="hold" grpId="0" nodeType="clickEffect">
+                                  <p:stCondLst>
+                                    <p:cond delay="0"/>
+                                  </p:stCondLst>
+                                  <p:childTnLst>
+                                    <p:set>
+                                      <p:cBhvr>
+                                        <p:cTn id="6" dur="1" fill="hold">
+                                          <p:stCondLst>
+                                            <p:cond delay="0"/>
+                                          </p:stCondLst>
+                                        </p:cTn>
+                                        <p:tgtEl>
+                                          <p:spTgt spid="4"/>
+                                        </p:tgtEl>
+                                        <p:attrNameLst>
+                                          <p:attrName>style.visibility</p:attrName>
+                                        </p:attrNameLst>
+                                      </p:cBhvr>
+                                      <p:to>
+                                        <p:strVal val="visible"/>
+                                      </p:to>
+                                    </p:set>
+                                  </p:childTnLst>
+                                </p:cTn>
+                              </p:par>
+                            </p:childTnLst>
+                          </p:cTn>
+                        </p:par>
+                      </p:childTnLst>
+                    </p:cTn>
+                  </p:par>
+                </p:childTnLst>
+              </p:cTn>
+              <p:prevCondLst>
+                <p:cond evt="onPrev" delay="0">
+                  <p:tgtEl>
+                    <p:sldTgt/>
+                  </p:tgtEl>
+                </p:cond>
+              </p:prevCondLst>
+              <p:nextCondLst>
+                <p:cond evt="onNext" delay="0">
+                  <p:tgtEl>
+                    <p:sldTgt/>
+                  </p:tgtEl>
+                </p:cond>
+              </p:nextCondLst>
+            </p:seq>
+          </p:childTnLst>
+        </p:cTn>
+      </p:par>
+    </p:tnLst>
+    <p:bldLst>
+      <p:bldP spid="4" grpId="0"/>
+    </p:bldLst>
+  </p:timing>
 </p:sld>
 </file>
 

</xml_diff>